<commit_message>
Atualizando slides da aula 02 com conteúdo de git
</commit_message>
<xml_diff>
--- a/slides/aula_02.pptx
+++ b/slides/aula_02.pptx
@@ -5,7 +5,7 @@
     <p:sldMasterId id="2147483659" r:id="rId1"/>
   </p:sldMasterIdLst>
   <p:notesMasterIdLst>
-    <p:notesMasterId r:id="rId10"/>
+    <p:notesMasterId r:id="rId12"/>
   </p:notesMasterIdLst>
   <p:sldIdLst>
     <p:sldId id="256" r:id="rId2"/>
@@ -13,32 +13,34 @@
     <p:sldId id="284" r:id="rId4"/>
     <p:sldId id="278" r:id="rId5"/>
     <p:sldId id="276" r:id="rId6"/>
-    <p:sldId id="285" r:id="rId7"/>
-    <p:sldId id="270" r:id="rId8"/>
-    <p:sldId id="267" r:id="rId9"/>
+    <p:sldId id="287" r:id="rId7"/>
+    <p:sldId id="286" r:id="rId8"/>
+    <p:sldId id="285" r:id="rId9"/>
+    <p:sldId id="270" r:id="rId10"/>
+    <p:sldId id="267" r:id="rId11"/>
   </p:sldIdLst>
   <p:sldSz cx="9144000" cy="5143500" type="screen16x9"/>
   <p:notesSz cx="6858000" cy="9144000"/>
   <p:embeddedFontLst>
     <p:embeddedFont>
       <p:font typeface="Consolas" panose="020B0609020204030204" pitchFamily="49" charset="0"/>
-      <p:regular r:id="rId11"/>
-      <p:bold r:id="rId12"/>
-      <p:italic r:id="rId13"/>
-      <p:boldItalic r:id="rId14"/>
+      <p:regular r:id="rId13"/>
+      <p:bold r:id="rId14"/>
+      <p:italic r:id="rId15"/>
+      <p:boldItalic r:id="rId16"/>
     </p:embeddedFont>
     <p:embeddedFont>
       <p:font typeface="Montserrat" pitchFamily="2" charset="77"/>
-      <p:regular r:id="rId15"/>
-      <p:bold r:id="rId16"/>
-      <p:italic r:id="rId17"/>
-      <p:boldItalic r:id="rId18"/>
+      <p:regular r:id="rId17"/>
+      <p:bold r:id="rId18"/>
+      <p:italic r:id="rId19"/>
+      <p:boldItalic r:id="rId20"/>
     </p:embeddedFont>
     <p:embeddedFont>
       <p:font typeface="Montserrat Black" panose="020F0502020204030204" pitchFamily="34" charset="0"/>
-      <p:bold r:id="rId19"/>
-      <p:italic r:id="rId20"/>
-      <p:boldItalic r:id="rId21"/>
+      <p:bold r:id="rId21"/>
+      <p:italic r:id="rId22"/>
+      <p:boldItalic r:id="rId23"/>
     </p:embeddedFont>
   </p:embeddedFontLst>
   <p:defaultTextStyle>
@@ -859,6 +861,110 @@
 </p:notes>
 </file>
 
+<file path=ppt/notesSlides/notesSlide10.xml><?xml version="1.0" encoding="utf-8"?>
+<p:notes xmlns:a="http://schemas.openxmlformats.org/drawingml/2006/main" xmlns:r="http://schemas.openxmlformats.org/officeDocument/2006/relationships" xmlns:p="http://schemas.openxmlformats.org/presentationml/2006/main" showMasterSp="0" showMasterPhAnim="0">
+  <p:cSld>
+    <p:spTree>
+      <p:nvGrpSpPr>
+        <p:cNvPr id="1" name="Shape 145"/>
+        <p:cNvGrpSpPr/>
+        <p:nvPr/>
+      </p:nvGrpSpPr>
+      <p:grpSpPr>
+        <a:xfrm>
+          <a:off x="0" y="0"/>
+          <a:ext cx="0" cy="0"/>
+          <a:chOff x="0" y="0"/>
+          <a:chExt cx="0" cy="0"/>
+        </a:xfrm>
+      </p:grpSpPr>
+      <p:sp>
+        <p:nvSpPr>
+          <p:cNvPr id="146" name="Google Shape;146;g1059654baf8_0_69:notes"/>
+          <p:cNvSpPr>
+            <a:spLocks noGrp="1" noRot="1" noChangeAspect="1"/>
+          </p:cNvSpPr>
+          <p:nvPr>
+            <p:ph type="sldImg" idx="2"/>
+          </p:nvPr>
+        </p:nvSpPr>
+        <p:spPr>
+          <a:xfrm>
+            <a:off x="381000" y="685800"/>
+            <a:ext cx="6096000" cy="3429000"/>
+          </a:xfrm>
+          <a:custGeom>
+            <a:avLst/>
+            <a:gdLst/>
+            <a:ahLst/>
+            <a:cxnLst/>
+            <a:rect l="l" t="t" r="r" b="b"/>
+            <a:pathLst>
+              <a:path w="120000" h="120000" extrusionOk="0">
+                <a:moveTo>
+                  <a:pt x="0" y="0"/>
+                </a:moveTo>
+                <a:lnTo>
+                  <a:pt x="120000" y="0"/>
+                </a:lnTo>
+                <a:lnTo>
+                  <a:pt x="120000" y="120000"/>
+                </a:lnTo>
+                <a:lnTo>
+                  <a:pt x="0" y="120000"/>
+                </a:lnTo>
+                <a:close/>
+              </a:path>
+            </a:pathLst>
+          </a:custGeom>
+        </p:spPr>
+      </p:sp>
+      <p:sp>
+        <p:nvSpPr>
+          <p:cNvPr id="147" name="Google Shape;147;g1059654baf8_0_69:notes"/>
+          <p:cNvSpPr txBox="1">
+            <a:spLocks noGrp="1"/>
+          </p:cNvSpPr>
+          <p:nvPr>
+            <p:ph type="body" idx="1"/>
+          </p:nvPr>
+        </p:nvSpPr>
+        <p:spPr>
+          <a:xfrm>
+            <a:off x="685800" y="4343400"/>
+            <a:ext cx="5486400" cy="4114800"/>
+          </a:xfrm>
+          <a:prstGeom prst="rect">
+            <a:avLst/>
+          </a:prstGeom>
+        </p:spPr>
+        <p:txBody>
+          <a:bodyPr spcFirstLastPara="1" wrap="square" lIns="91425" tIns="91425" rIns="91425" bIns="91425" anchor="t" anchorCtr="0">
+            <a:noAutofit/>
+          </a:bodyPr>
+          <a:lstStyle/>
+          <a:p>
+            <a:pPr marL="0" lvl="0" indent="0" algn="l" rtl="0">
+              <a:spcBef>
+                <a:spcPts val="0"/>
+              </a:spcBef>
+              <a:spcAft>
+                <a:spcPts val="0"/>
+              </a:spcAft>
+              <a:buNone/>
+            </a:pPr>
+            <a:endParaRPr dirty="0"/>
+          </a:p>
+        </p:txBody>
+      </p:sp>
+    </p:spTree>
+  </p:cSld>
+  <p:clrMapOvr>
+    <a:masterClrMapping/>
+  </p:clrMapOvr>
+</p:notes>
+</file>
+
 <file path=ppt/notesSlides/notesSlide2.xml><?xml version="1.0" encoding="utf-8"?>
 <p:notes xmlns:a="http://schemas.openxmlformats.org/drawingml/2006/main" xmlns:r="http://schemas.openxmlformats.org/officeDocument/2006/relationships" xmlns:p="http://schemas.openxmlformats.org/presentationml/2006/main" showMasterSp="0" showMasterPhAnim="0">
   <p:cSld>
@@ -1191,6 +1297,46 @@
               </a:spcAft>
               <a:buNone/>
             </a:pPr>
+            <a:r>
+              <a:rPr lang="en-US" dirty="0"/>
+              <a:t>O python </a:t>
+            </a:r>
+            <a:r>
+              <a:rPr lang="en-US" dirty="0" err="1"/>
+              <a:t>consegue</a:t>
+            </a:r>
+            <a:r>
+              <a:rPr lang="en-US" dirty="0"/>
+              <a:t> </a:t>
+            </a:r>
+            <a:r>
+              <a:rPr lang="en-US" dirty="0" err="1"/>
+              <a:t>inferir</a:t>
+            </a:r>
+            <a:r>
+              <a:rPr lang="en-US" dirty="0"/>
+              <a:t> </a:t>
+            </a:r>
+            <a:r>
+              <a:rPr lang="en-US" dirty="0" err="1"/>
+              <a:t>os</a:t>
+            </a:r>
+            <a:r>
+              <a:rPr lang="en-US" dirty="0"/>
+              <a:t> </a:t>
+            </a:r>
+            <a:r>
+              <a:rPr lang="en-US" dirty="0" err="1"/>
+              <a:t>tipos</a:t>
+            </a:r>
+            <a:r>
+              <a:rPr lang="en-US" dirty="0"/>
+              <a:t> </a:t>
+            </a:r>
+            <a:r>
+              <a:rPr lang="en-US" dirty="0" err="1"/>
+              <a:t>automaticamente</a:t>
+            </a:r>
             <a:endParaRPr dirty="0"/>
           </a:p>
         </p:txBody>
@@ -1416,6 +1562,893 @@
     </p:spTree>
     <p:extLst>
       <p:ext uri="{BB962C8B-B14F-4D97-AF65-F5344CB8AC3E}">
+        <p14:creationId xmlns:p14="http://schemas.microsoft.com/office/powerpoint/2010/main" val="2267038458"/>
+      </p:ext>
+    </p:extLst>
+  </p:cSld>
+  <p:clrMapOvr>
+    <a:masterClrMapping/>
+  </p:clrMapOvr>
+</p:notes>
+</file>
+
+<file path=ppt/notesSlides/notesSlide7.xml><?xml version="1.0" encoding="utf-8"?>
+<p:notes xmlns:a="http://schemas.openxmlformats.org/drawingml/2006/main" xmlns:r="http://schemas.openxmlformats.org/officeDocument/2006/relationships" xmlns:p="http://schemas.openxmlformats.org/presentationml/2006/main" showMasterSp="0" showMasterPhAnim="0">
+  <p:cSld>
+    <p:spTree>
+      <p:nvGrpSpPr>
+        <p:cNvPr id="1" name="Shape 75"/>
+        <p:cNvGrpSpPr/>
+        <p:nvPr/>
+      </p:nvGrpSpPr>
+      <p:grpSpPr>
+        <a:xfrm>
+          <a:off x="0" y="0"/>
+          <a:ext cx="0" cy="0"/>
+          <a:chOff x="0" y="0"/>
+          <a:chExt cx="0" cy="0"/>
+        </a:xfrm>
+      </p:grpSpPr>
+      <p:sp>
+        <p:nvSpPr>
+          <p:cNvPr id="76" name="Google Shape;76;g1059654baf8_0_34:notes"/>
+          <p:cNvSpPr>
+            <a:spLocks noGrp="1" noRot="1" noChangeAspect="1"/>
+          </p:cNvSpPr>
+          <p:nvPr>
+            <p:ph type="sldImg" idx="2"/>
+          </p:nvPr>
+        </p:nvSpPr>
+        <p:spPr>
+          <a:xfrm>
+            <a:off x="381000" y="685800"/>
+            <a:ext cx="6096000" cy="3429000"/>
+          </a:xfrm>
+          <a:custGeom>
+            <a:avLst/>
+            <a:gdLst/>
+            <a:ahLst/>
+            <a:cxnLst/>
+            <a:rect l="l" t="t" r="r" b="b"/>
+            <a:pathLst>
+              <a:path w="120000" h="120000" extrusionOk="0">
+                <a:moveTo>
+                  <a:pt x="0" y="0"/>
+                </a:moveTo>
+                <a:lnTo>
+                  <a:pt x="120000" y="0"/>
+                </a:lnTo>
+                <a:lnTo>
+                  <a:pt x="120000" y="120000"/>
+                </a:lnTo>
+                <a:lnTo>
+                  <a:pt x="0" y="120000"/>
+                </a:lnTo>
+                <a:close/>
+              </a:path>
+            </a:pathLst>
+          </a:custGeom>
+        </p:spPr>
+      </p:sp>
+      <p:sp>
+        <p:nvSpPr>
+          <p:cNvPr id="77" name="Google Shape;77;g1059654baf8_0_34:notes"/>
+          <p:cNvSpPr txBox="1">
+            <a:spLocks noGrp="1"/>
+          </p:cNvSpPr>
+          <p:nvPr>
+            <p:ph type="body" idx="1"/>
+          </p:nvPr>
+        </p:nvSpPr>
+        <p:spPr>
+          <a:xfrm>
+            <a:off x="685800" y="4343400"/>
+            <a:ext cx="5486400" cy="4114800"/>
+          </a:xfrm>
+          <a:prstGeom prst="rect">
+            <a:avLst/>
+          </a:prstGeom>
+        </p:spPr>
+        <p:txBody>
+          <a:bodyPr spcFirstLastPara="1" wrap="square" lIns="91425" tIns="91425" rIns="91425" bIns="91425" anchor="t" anchorCtr="0">
+            <a:noAutofit/>
+          </a:bodyPr>
+          <a:lstStyle/>
+          <a:p>
+            <a:pPr marL="0" lvl="0" indent="0" algn="l" rtl="0">
+              <a:spcBef>
+                <a:spcPts val="0"/>
+              </a:spcBef>
+              <a:spcAft>
+                <a:spcPts val="0"/>
+              </a:spcAft>
+              <a:buNone/>
+            </a:pPr>
+            <a:endParaRPr dirty="0"/>
+          </a:p>
+        </p:txBody>
+      </p:sp>
+    </p:spTree>
+    <p:extLst>
+      <p:ext uri="{BB962C8B-B14F-4D97-AF65-F5344CB8AC3E}">
+        <p14:creationId xmlns:p14="http://schemas.microsoft.com/office/powerpoint/2010/main" val="1111800296"/>
+      </p:ext>
+    </p:extLst>
+  </p:cSld>
+  <p:clrMapOvr>
+    <a:masterClrMapping/>
+  </p:clrMapOvr>
+</p:notes>
+</file>
+
+<file path=ppt/notesSlides/notesSlide8.xml><?xml version="1.0" encoding="utf-8"?>
+<p:notes xmlns:a="http://schemas.openxmlformats.org/drawingml/2006/main" xmlns:r="http://schemas.openxmlformats.org/officeDocument/2006/relationships" xmlns:p="http://schemas.openxmlformats.org/presentationml/2006/main" showMasterSp="0" showMasterPhAnim="0">
+  <p:cSld>
+    <p:spTree>
+      <p:nvGrpSpPr>
+        <p:cNvPr id="1" name="Shape 75"/>
+        <p:cNvGrpSpPr/>
+        <p:nvPr/>
+      </p:nvGrpSpPr>
+      <p:grpSpPr>
+        <a:xfrm>
+          <a:off x="0" y="0"/>
+          <a:ext cx="0" cy="0"/>
+          <a:chOff x="0" y="0"/>
+          <a:chExt cx="0" cy="0"/>
+        </a:xfrm>
+      </p:grpSpPr>
+      <p:sp>
+        <p:nvSpPr>
+          <p:cNvPr id="76" name="Google Shape;76;g1059654baf8_0_34:notes"/>
+          <p:cNvSpPr>
+            <a:spLocks noGrp="1" noRot="1" noChangeAspect="1"/>
+          </p:cNvSpPr>
+          <p:nvPr>
+            <p:ph type="sldImg" idx="2"/>
+          </p:nvPr>
+        </p:nvSpPr>
+        <p:spPr>
+          <a:xfrm>
+            <a:off x="381000" y="685800"/>
+            <a:ext cx="6096000" cy="3429000"/>
+          </a:xfrm>
+          <a:custGeom>
+            <a:avLst/>
+            <a:gdLst/>
+            <a:ahLst/>
+            <a:cxnLst/>
+            <a:rect l="l" t="t" r="r" b="b"/>
+            <a:pathLst>
+              <a:path w="120000" h="120000" extrusionOk="0">
+                <a:moveTo>
+                  <a:pt x="0" y="0"/>
+                </a:moveTo>
+                <a:lnTo>
+                  <a:pt x="120000" y="0"/>
+                </a:lnTo>
+                <a:lnTo>
+                  <a:pt x="120000" y="120000"/>
+                </a:lnTo>
+                <a:lnTo>
+                  <a:pt x="0" y="120000"/>
+                </a:lnTo>
+                <a:close/>
+              </a:path>
+            </a:pathLst>
+          </a:custGeom>
+        </p:spPr>
+      </p:sp>
+      <p:sp>
+        <p:nvSpPr>
+          <p:cNvPr id="77" name="Google Shape;77;g1059654baf8_0_34:notes"/>
+          <p:cNvSpPr txBox="1">
+            <a:spLocks noGrp="1"/>
+          </p:cNvSpPr>
+          <p:nvPr>
+            <p:ph type="body" idx="1"/>
+          </p:nvPr>
+        </p:nvSpPr>
+        <p:spPr>
+          <a:xfrm>
+            <a:off x="685800" y="4343400"/>
+            <a:ext cx="5486400" cy="4114800"/>
+          </a:xfrm>
+          <a:prstGeom prst="rect">
+            <a:avLst/>
+          </a:prstGeom>
+        </p:spPr>
+        <p:txBody>
+          <a:bodyPr spcFirstLastPara="1" wrap="square" lIns="91425" tIns="91425" rIns="91425" bIns="91425" anchor="t" anchorCtr="0">
+            <a:noAutofit/>
+          </a:bodyPr>
+          <a:lstStyle/>
+          <a:p>
+            <a:r>
+              <a:rPr lang="en-US" sz="1100" b="0" i="0" u="none" strike="noStrike" cap="none" dirty="0">
+                <a:solidFill>
+                  <a:srgbClr val="000000"/>
+                </a:solidFill>
+                <a:effectLst/>
+                <a:latin typeface="Arial"/>
+                <a:ea typeface="Arial"/>
+                <a:cs typeface="Arial"/>
+                <a:sym typeface="Arial"/>
+              </a:rPr>
+              <a:t>Python sempre </a:t>
+            </a:r>
+            <a:r>
+              <a:rPr lang="en-US" sz="1100" b="0" i="0" u="none" strike="noStrike" cap="none" dirty="0" err="1">
+                <a:solidFill>
+                  <a:srgbClr val="000000"/>
+                </a:solidFill>
+                <a:effectLst/>
+                <a:latin typeface="Arial"/>
+                <a:ea typeface="Arial"/>
+                <a:cs typeface="Arial"/>
+                <a:sym typeface="Arial"/>
+              </a:rPr>
+              <a:t>usará</a:t>
+            </a:r>
+            <a:r>
+              <a:rPr lang="en-US" sz="1100" b="0" i="0" u="none" strike="noStrike" cap="none" dirty="0">
+                <a:solidFill>
+                  <a:srgbClr val="000000"/>
+                </a:solidFill>
+                <a:effectLst/>
+                <a:latin typeface="Arial"/>
+                <a:ea typeface="Arial"/>
+                <a:cs typeface="Arial"/>
+                <a:sym typeface="Arial"/>
+              </a:rPr>
+              <a:t> </a:t>
+            </a:r>
+            <a:r>
+              <a:rPr lang="en-US" sz="1100" b="0" i="0" u="none" strike="noStrike" cap="none" dirty="0" err="1">
+                <a:solidFill>
+                  <a:srgbClr val="000000"/>
+                </a:solidFill>
+                <a:effectLst/>
+                <a:latin typeface="Arial"/>
+                <a:ea typeface="Arial"/>
+                <a:cs typeface="Arial"/>
+                <a:sym typeface="Arial"/>
+              </a:rPr>
+              <a:t>os</a:t>
+            </a:r>
+            <a:r>
+              <a:rPr lang="en-US" sz="1100" b="0" i="0" u="none" strike="noStrike" cap="none" dirty="0">
+                <a:solidFill>
+                  <a:srgbClr val="000000"/>
+                </a:solidFill>
+                <a:effectLst/>
+                <a:latin typeface="Arial"/>
+                <a:ea typeface="Arial"/>
+                <a:cs typeface="Arial"/>
+                <a:sym typeface="Arial"/>
+              </a:rPr>
+              <a:t> </a:t>
+            </a:r>
+            <a:r>
+              <a:rPr lang="en-US" sz="1100" b="0" i="0" u="none" strike="noStrike" cap="none" dirty="0" err="1">
+                <a:solidFill>
+                  <a:srgbClr val="000000"/>
+                </a:solidFill>
+                <a:effectLst/>
+                <a:latin typeface="Arial"/>
+                <a:ea typeface="Arial"/>
+                <a:cs typeface="Arial"/>
+                <a:sym typeface="Arial"/>
+              </a:rPr>
+              <a:t>operadores</a:t>
+            </a:r>
+            <a:r>
+              <a:rPr lang="en-US" sz="1100" b="0" i="0" u="none" strike="noStrike" cap="none" dirty="0">
+                <a:solidFill>
+                  <a:srgbClr val="000000"/>
+                </a:solidFill>
+                <a:effectLst/>
+                <a:latin typeface="Arial"/>
+                <a:ea typeface="Arial"/>
+                <a:cs typeface="Arial"/>
+                <a:sym typeface="Arial"/>
+              </a:rPr>
+              <a:t> </a:t>
+            </a:r>
+            <a:r>
+              <a:rPr lang="en-US" sz="1100" b="0" i="0" u="none" strike="noStrike" cap="none" dirty="0" err="1">
+                <a:solidFill>
+                  <a:srgbClr val="000000"/>
+                </a:solidFill>
+                <a:effectLst/>
+                <a:latin typeface="Arial"/>
+                <a:ea typeface="Arial"/>
+                <a:cs typeface="Arial"/>
+                <a:sym typeface="Arial"/>
+              </a:rPr>
+              <a:t>aritméticos</a:t>
+            </a:r>
+            <a:r>
+              <a:rPr lang="en-US" sz="1100" b="0" i="0" u="none" strike="noStrike" cap="none" dirty="0">
+                <a:solidFill>
+                  <a:srgbClr val="000000"/>
+                </a:solidFill>
+                <a:effectLst/>
+                <a:latin typeface="Arial"/>
+                <a:ea typeface="Arial"/>
+                <a:cs typeface="Arial"/>
+                <a:sym typeface="Arial"/>
+              </a:rPr>
+              <a:t> </a:t>
+            </a:r>
+            <a:r>
+              <a:rPr lang="en-US" sz="1100" b="0" i="0" u="none" strike="noStrike" cap="none" dirty="0" err="1">
+                <a:solidFill>
+                  <a:srgbClr val="000000"/>
+                </a:solidFill>
+                <a:effectLst/>
+                <a:latin typeface="Arial"/>
+                <a:ea typeface="Arial"/>
+                <a:cs typeface="Arial"/>
+                <a:sym typeface="Arial"/>
+              </a:rPr>
+              <a:t>primeiro</a:t>
+            </a:r>
+            <a:r>
+              <a:rPr lang="en-US" sz="1100" b="0" i="0" u="none" strike="noStrike" cap="none" dirty="0">
+                <a:solidFill>
+                  <a:srgbClr val="000000"/>
+                </a:solidFill>
+                <a:effectLst/>
+                <a:latin typeface="Arial"/>
+                <a:ea typeface="Arial"/>
+                <a:cs typeface="Arial"/>
+                <a:sym typeface="Arial"/>
+              </a:rPr>
+              <a:t> (</a:t>
+            </a:r>
+            <a:r>
+              <a:rPr lang="en-US" sz="1100" b="0" i="0" u="none" strike="noStrike" cap="none" dirty="0" err="1">
+                <a:solidFill>
+                  <a:srgbClr val="000000"/>
+                </a:solidFill>
+                <a:effectLst/>
+                <a:latin typeface="Arial"/>
+                <a:ea typeface="Arial"/>
+                <a:cs typeface="Arial"/>
+                <a:sym typeface="Arial"/>
+              </a:rPr>
+              <a:t>exponenciação</a:t>
+            </a:r>
+            <a:r>
+              <a:rPr lang="en-US" sz="1100" b="0" i="0" u="none" strike="noStrike" cap="none" dirty="0">
+                <a:solidFill>
+                  <a:srgbClr val="000000"/>
+                </a:solidFill>
+                <a:effectLst/>
+                <a:latin typeface="Arial"/>
+                <a:ea typeface="Arial"/>
+                <a:cs typeface="Arial"/>
+                <a:sym typeface="Arial"/>
+              </a:rPr>
+              <a:t> </a:t>
+            </a:r>
+            <a:r>
+              <a:rPr lang="en-US" sz="1100" b="0" i="0" u="none" strike="noStrike" cap="none" dirty="0" err="1">
+                <a:solidFill>
+                  <a:srgbClr val="000000"/>
+                </a:solidFill>
+                <a:effectLst/>
+                <a:latin typeface="Arial"/>
+                <a:ea typeface="Arial"/>
+                <a:cs typeface="Arial"/>
+                <a:sym typeface="Arial"/>
+              </a:rPr>
+              <a:t>primeiro</a:t>
+            </a:r>
+            <a:r>
+              <a:rPr lang="en-US" sz="1100" b="0" i="0" u="none" strike="noStrike" cap="none" dirty="0">
+                <a:solidFill>
+                  <a:srgbClr val="000000"/>
+                </a:solidFill>
+                <a:effectLst/>
+                <a:latin typeface="Arial"/>
+                <a:ea typeface="Arial"/>
+                <a:cs typeface="Arial"/>
+                <a:sym typeface="Arial"/>
+              </a:rPr>
+              <a:t>, </a:t>
+            </a:r>
+            <a:r>
+              <a:rPr lang="en-US" sz="1100" b="0" i="0" u="none" strike="noStrike" cap="none" dirty="0" err="1">
+                <a:solidFill>
+                  <a:srgbClr val="000000"/>
+                </a:solidFill>
+                <a:effectLst/>
+                <a:latin typeface="Arial"/>
+                <a:ea typeface="Arial"/>
+                <a:cs typeface="Arial"/>
+                <a:sym typeface="Arial"/>
+              </a:rPr>
+              <a:t>depois</a:t>
+            </a:r>
+            <a:r>
+              <a:rPr lang="en-US" sz="1100" b="0" i="0" u="none" strike="noStrike" cap="none" dirty="0">
+                <a:solidFill>
+                  <a:srgbClr val="000000"/>
+                </a:solidFill>
+                <a:effectLst/>
+                <a:latin typeface="Arial"/>
+                <a:ea typeface="Arial"/>
+                <a:cs typeface="Arial"/>
+                <a:sym typeface="Arial"/>
+              </a:rPr>
+              <a:t> </a:t>
+            </a:r>
+            <a:r>
+              <a:rPr lang="en-US" sz="1100" b="0" i="0" u="none" strike="noStrike" cap="none" dirty="0" err="1">
+                <a:solidFill>
+                  <a:srgbClr val="000000"/>
+                </a:solidFill>
+                <a:effectLst/>
+                <a:latin typeface="Arial"/>
+                <a:ea typeface="Arial"/>
+                <a:cs typeface="Arial"/>
+                <a:sym typeface="Arial"/>
+              </a:rPr>
+              <a:t>multiplicação</a:t>
+            </a:r>
+            <a:r>
+              <a:rPr lang="en-US" sz="1100" b="0" i="0" u="none" strike="noStrike" cap="none" dirty="0">
+                <a:solidFill>
+                  <a:srgbClr val="000000"/>
+                </a:solidFill>
+                <a:effectLst/>
+                <a:latin typeface="Arial"/>
+                <a:ea typeface="Arial"/>
+                <a:cs typeface="Arial"/>
+                <a:sym typeface="Arial"/>
+              </a:rPr>
+              <a:t>/</a:t>
+            </a:r>
+            <a:r>
+              <a:rPr lang="en-US" sz="1100" b="0" i="0" u="none" strike="noStrike" cap="none" dirty="0" err="1">
+                <a:solidFill>
+                  <a:srgbClr val="000000"/>
+                </a:solidFill>
+                <a:effectLst/>
+                <a:latin typeface="Arial"/>
+                <a:ea typeface="Arial"/>
+                <a:cs typeface="Arial"/>
+                <a:sym typeface="Arial"/>
+              </a:rPr>
+              <a:t>divisão</a:t>
+            </a:r>
+            <a:r>
+              <a:rPr lang="en-US" sz="1100" b="0" i="0" u="none" strike="noStrike" cap="none" dirty="0">
+                <a:solidFill>
+                  <a:srgbClr val="000000"/>
+                </a:solidFill>
+                <a:effectLst/>
+                <a:latin typeface="Arial"/>
+                <a:ea typeface="Arial"/>
+                <a:cs typeface="Arial"/>
+                <a:sym typeface="Arial"/>
+              </a:rPr>
+              <a:t> e </a:t>
+            </a:r>
+            <a:r>
+              <a:rPr lang="en-US" sz="1100" b="0" i="0" u="none" strike="noStrike" cap="none" dirty="0" err="1">
+                <a:solidFill>
+                  <a:srgbClr val="000000"/>
+                </a:solidFill>
+                <a:effectLst/>
+                <a:latin typeface="Arial"/>
+                <a:ea typeface="Arial"/>
+                <a:cs typeface="Arial"/>
+                <a:sym typeface="Arial"/>
+              </a:rPr>
+              <a:t>depois</a:t>
+            </a:r>
+            <a:r>
+              <a:rPr lang="en-US" sz="1100" b="0" i="0" u="none" strike="noStrike" cap="none" dirty="0">
+                <a:solidFill>
+                  <a:srgbClr val="000000"/>
+                </a:solidFill>
+                <a:effectLst/>
+                <a:latin typeface="Arial"/>
+                <a:ea typeface="Arial"/>
+                <a:cs typeface="Arial"/>
+                <a:sym typeface="Arial"/>
+              </a:rPr>
+              <a:t> </a:t>
+            </a:r>
+            <a:r>
+              <a:rPr lang="en-US" sz="1100" b="0" i="0" u="none" strike="noStrike" cap="none" dirty="0" err="1">
+                <a:solidFill>
+                  <a:srgbClr val="000000"/>
+                </a:solidFill>
+                <a:effectLst/>
+                <a:latin typeface="Arial"/>
+                <a:ea typeface="Arial"/>
+                <a:cs typeface="Arial"/>
+                <a:sym typeface="Arial"/>
+              </a:rPr>
+              <a:t>adição</a:t>
+            </a:r>
+            <a:r>
+              <a:rPr lang="en-US" sz="1100" b="0" i="0" u="none" strike="noStrike" cap="none" dirty="0">
+                <a:solidFill>
+                  <a:srgbClr val="000000"/>
+                </a:solidFill>
+                <a:effectLst/>
+                <a:latin typeface="Arial"/>
+                <a:ea typeface="Arial"/>
+                <a:cs typeface="Arial"/>
+                <a:sym typeface="Arial"/>
+              </a:rPr>
+              <a:t>/</a:t>
+            </a:r>
+            <a:r>
+              <a:rPr lang="en-US" sz="1100" b="0" i="0" u="none" strike="noStrike" cap="none" dirty="0" err="1">
+                <a:solidFill>
+                  <a:srgbClr val="000000"/>
+                </a:solidFill>
+                <a:effectLst/>
+                <a:latin typeface="Arial"/>
+                <a:ea typeface="Arial"/>
+                <a:cs typeface="Arial"/>
+                <a:sym typeface="Arial"/>
+              </a:rPr>
+              <a:t>subtração</a:t>
+            </a:r>
+            <a:r>
+              <a:rPr lang="en-US" sz="1100" b="0" i="0" u="none" strike="noStrike" cap="none" dirty="0">
+                <a:solidFill>
+                  <a:srgbClr val="000000"/>
+                </a:solidFill>
+                <a:effectLst/>
+                <a:latin typeface="Arial"/>
+                <a:ea typeface="Arial"/>
+                <a:cs typeface="Arial"/>
+                <a:sym typeface="Arial"/>
+              </a:rPr>
+              <a:t>). </a:t>
+            </a:r>
+          </a:p>
+          <a:p>
+            <a:r>
+              <a:rPr lang="en-US" sz="1100" b="0" i="0" u="none" strike="noStrike" cap="none" dirty="0" err="1">
+                <a:solidFill>
+                  <a:srgbClr val="000000"/>
+                </a:solidFill>
+                <a:effectLst/>
+                <a:latin typeface="Arial"/>
+                <a:ea typeface="Arial"/>
+                <a:cs typeface="Arial"/>
+                <a:sym typeface="Arial"/>
+              </a:rPr>
+              <a:t>Depois</a:t>
+            </a:r>
+            <a:r>
+              <a:rPr lang="en-US" sz="1100" b="0" i="0" u="none" strike="noStrike" cap="none" dirty="0">
+                <a:solidFill>
+                  <a:srgbClr val="000000"/>
+                </a:solidFill>
+                <a:effectLst/>
+                <a:latin typeface="Arial"/>
+                <a:ea typeface="Arial"/>
+                <a:cs typeface="Arial"/>
+                <a:sym typeface="Arial"/>
+              </a:rPr>
+              <a:t> </a:t>
+            </a:r>
+            <a:r>
+              <a:rPr lang="en-US" sz="1100" b="0" i="0" u="none" strike="noStrike" cap="none" dirty="0" err="1">
+                <a:solidFill>
+                  <a:srgbClr val="000000"/>
+                </a:solidFill>
+                <a:effectLst/>
+                <a:latin typeface="Arial"/>
+                <a:ea typeface="Arial"/>
+                <a:cs typeface="Arial"/>
+                <a:sym typeface="Arial"/>
+              </a:rPr>
+              <a:t>vêm</a:t>
+            </a:r>
+            <a:r>
+              <a:rPr lang="en-US" sz="1100" b="0" i="0" u="none" strike="noStrike" cap="none" dirty="0">
+                <a:solidFill>
+                  <a:srgbClr val="000000"/>
+                </a:solidFill>
+                <a:effectLst/>
+                <a:latin typeface="Arial"/>
+                <a:ea typeface="Arial"/>
+                <a:cs typeface="Arial"/>
+                <a:sym typeface="Arial"/>
+              </a:rPr>
+              <a:t> </a:t>
+            </a:r>
+            <a:r>
+              <a:rPr lang="en-US" sz="1100" b="0" i="0" u="none" strike="noStrike" cap="none" dirty="0" err="1">
+                <a:solidFill>
+                  <a:srgbClr val="000000"/>
+                </a:solidFill>
+                <a:effectLst/>
+                <a:latin typeface="Arial"/>
+                <a:ea typeface="Arial"/>
+                <a:cs typeface="Arial"/>
+                <a:sym typeface="Arial"/>
+              </a:rPr>
+              <a:t>os</a:t>
+            </a:r>
+            <a:r>
+              <a:rPr lang="en-US" sz="1100" b="0" i="0" u="none" strike="noStrike" cap="none" dirty="0">
+                <a:solidFill>
+                  <a:srgbClr val="000000"/>
+                </a:solidFill>
+                <a:effectLst/>
+                <a:latin typeface="Arial"/>
+                <a:ea typeface="Arial"/>
+                <a:cs typeface="Arial"/>
+                <a:sym typeface="Arial"/>
+              </a:rPr>
+              <a:t> </a:t>
+            </a:r>
+            <a:r>
+              <a:rPr lang="en-US" sz="1100" b="0" i="0" u="none" strike="noStrike" cap="none" dirty="0" err="1">
+                <a:solidFill>
+                  <a:srgbClr val="000000"/>
+                </a:solidFill>
+                <a:effectLst/>
+                <a:latin typeface="Arial"/>
+                <a:ea typeface="Arial"/>
+                <a:cs typeface="Arial"/>
+                <a:sym typeface="Arial"/>
+              </a:rPr>
+              <a:t>operadores</a:t>
+            </a:r>
+            <a:r>
+              <a:rPr lang="en-US" sz="1100" b="0" i="0" u="none" strike="noStrike" cap="none" dirty="0">
+                <a:solidFill>
+                  <a:srgbClr val="000000"/>
+                </a:solidFill>
+                <a:effectLst/>
+                <a:latin typeface="Arial"/>
+                <a:ea typeface="Arial"/>
+                <a:cs typeface="Arial"/>
+                <a:sym typeface="Arial"/>
+              </a:rPr>
+              <a:t> de </a:t>
+            </a:r>
+            <a:r>
+              <a:rPr lang="en-US" sz="1100" b="0" i="0" u="none" strike="noStrike" cap="none" dirty="0" err="1">
+                <a:solidFill>
+                  <a:srgbClr val="000000"/>
+                </a:solidFill>
+                <a:effectLst/>
+                <a:latin typeface="Arial"/>
+                <a:ea typeface="Arial"/>
+                <a:cs typeface="Arial"/>
+                <a:sym typeface="Arial"/>
+              </a:rPr>
+              <a:t>comparação</a:t>
+            </a:r>
+            <a:r>
+              <a:rPr lang="en-US" sz="1100" b="0" i="0" u="none" strike="noStrike" cap="none" dirty="0">
+                <a:solidFill>
+                  <a:srgbClr val="000000"/>
+                </a:solidFill>
+                <a:effectLst/>
+                <a:latin typeface="Arial"/>
+                <a:ea typeface="Arial"/>
+                <a:cs typeface="Arial"/>
+                <a:sym typeface="Arial"/>
+              </a:rPr>
+              <a:t> </a:t>
+            </a:r>
+            <a:r>
+              <a:rPr lang="en-US" sz="1100" b="0" i="0" u="none" strike="noStrike" cap="none" dirty="0" err="1">
+                <a:solidFill>
+                  <a:srgbClr val="000000"/>
+                </a:solidFill>
+                <a:effectLst/>
+                <a:latin typeface="Arial"/>
+                <a:ea typeface="Arial"/>
+                <a:cs typeface="Arial"/>
+                <a:sym typeface="Arial"/>
+              </a:rPr>
+              <a:t>relacionais</a:t>
+            </a:r>
+            <a:r>
+              <a:rPr lang="en-US" sz="1100" b="0" i="0" u="none" strike="noStrike" cap="none" dirty="0">
+                <a:solidFill>
+                  <a:srgbClr val="000000"/>
+                </a:solidFill>
+                <a:effectLst/>
+                <a:latin typeface="Arial"/>
+                <a:ea typeface="Arial"/>
+                <a:cs typeface="Arial"/>
+                <a:sym typeface="Arial"/>
+              </a:rPr>
+              <a:t> (`==,!=,&lt;=,&gt;=,&gt;,&lt;`). </a:t>
+            </a:r>
+          </a:p>
+          <a:p>
+            <a:r>
+              <a:rPr lang="en-US" sz="1100" b="0" i="0" u="none" strike="noStrike" cap="none" dirty="0" err="1">
+                <a:solidFill>
+                  <a:srgbClr val="000000"/>
+                </a:solidFill>
+                <a:effectLst/>
+                <a:latin typeface="Arial"/>
+                <a:ea typeface="Arial"/>
+                <a:cs typeface="Arial"/>
+                <a:sym typeface="Arial"/>
+              </a:rPr>
+              <a:t>Finalmente</a:t>
+            </a:r>
+            <a:r>
+              <a:rPr lang="en-US" sz="1100" b="0" i="0" u="none" strike="noStrike" cap="none" dirty="0">
+                <a:solidFill>
+                  <a:srgbClr val="000000"/>
+                </a:solidFill>
+                <a:effectLst/>
+                <a:latin typeface="Arial"/>
+                <a:ea typeface="Arial"/>
+                <a:cs typeface="Arial"/>
+                <a:sym typeface="Arial"/>
+              </a:rPr>
+              <a:t>, </a:t>
+            </a:r>
+            <a:r>
+              <a:rPr lang="en-US" sz="1100" b="0" i="0" u="none" strike="noStrike" cap="none" dirty="0" err="1">
+                <a:solidFill>
+                  <a:srgbClr val="000000"/>
+                </a:solidFill>
+                <a:effectLst/>
+                <a:latin typeface="Arial"/>
+                <a:ea typeface="Arial"/>
+                <a:cs typeface="Arial"/>
+                <a:sym typeface="Arial"/>
+              </a:rPr>
+              <a:t>os</a:t>
+            </a:r>
+            <a:r>
+              <a:rPr lang="en-US" sz="1100" b="0" i="0" u="none" strike="noStrike" cap="none" dirty="0">
+                <a:solidFill>
+                  <a:srgbClr val="000000"/>
+                </a:solidFill>
+                <a:effectLst/>
+                <a:latin typeface="Arial"/>
+                <a:ea typeface="Arial"/>
+                <a:cs typeface="Arial"/>
+                <a:sym typeface="Arial"/>
+              </a:rPr>
+              <a:t> </a:t>
+            </a:r>
+            <a:r>
+              <a:rPr lang="en-US" sz="1100" b="0" i="0" u="none" strike="noStrike" cap="none" dirty="0" err="1">
+                <a:solidFill>
+                  <a:srgbClr val="000000"/>
+                </a:solidFill>
+                <a:effectLst/>
+                <a:latin typeface="Arial"/>
+                <a:ea typeface="Arial"/>
+                <a:cs typeface="Arial"/>
+                <a:sym typeface="Arial"/>
+              </a:rPr>
+              <a:t>operadores</a:t>
+            </a:r>
+            <a:r>
+              <a:rPr lang="en-US" sz="1100" b="0" i="0" u="none" strike="noStrike" cap="none" dirty="0">
+                <a:solidFill>
+                  <a:srgbClr val="000000"/>
+                </a:solidFill>
+                <a:effectLst/>
+                <a:latin typeface="Arial"/>
+                <a:ea typeface="Arial"/>
+                <a:cs typeface="Arial"/>
+                <a:sym typeface="Arial"/>
+              </a:rPr>
+              <a:t> </a:t>
+            </a:r>
+            <a:r>
+              <a:rPr lang="en-US" sz="1100" b="0" i="0" u="none" strike="noStrike" cap="none" dirty="0" err="1">
+                <a:solidFill>
+                  <a:srgbClr val="000000"/>
+                </a:solidFill>
+                <a:effectLst/>
+                <a:latin typeface="Arial"/>
+                <a:ea typeface="Arial"/>
+                <a:cs typeface="Arial"/>
+                <a:sym typeface="Arial"/>
+              </a:rPr>
+              <a:t>lógicos</a:t>
+            </a:r>
+            <a:r>
+              <a:rPr lang="en-US" sz="1100" b="0" i="0" u="none" strike="noStrike" cap="none" dirty="0">
+                <a:solidFill>
+                  <a:srgbClr val="000000"/>
+                </a:solidFill>
+                <a:effectLst/>
+                <a:latin typeface="Arial"/>
+                <a:ea typeface="Arial"/>
+                <a:cs typeface="Arial"/>
+                <a:sym typeface="Arial"/>
+              </a:rPr>
+              <a:t> </a:t>
+            </a:r>
+            <a:r>
+              <a:rPr lang="en-US" sz="1100" b="0" i="0" u="none" strike="noStrike" cap="none" dirty="0" err="1">
+                <a:solidFill>
+                  <a:srgbClr val="000000"/>
+                </a:solidFill>
+                <a:effectLst/>
+                <a:latin typeface="Arial"/>
+                <a:ea typeface="Arial"/>
+                <a:cs typeface="Arial"/>
+                <a:sym typeface="Arial"/>
+              </a:rPr>
+              <a:t>vêm</a:t>
+            </a:r>
+            <a:r>
+              <a:rPr lang="en-US" sz="1100" b="0" i="0" u="none" strike="noStrike" cap="none" dirty="0">
+                <a:solidFill>
+                  <a:srgbClr val="000000"/>
+                </a:solidFill>
+                <a:effectLst/>
+                <a:latin typeface="Arial"/>
+                <a:ea typeface="Arial"/>
+                <a:cs typeface="Arial"/>
+                <a:sym typeface="Arial"/>
+              </a:rPr>
+              <a:t> por </a:t>
+            </a:r>
+            <a:r>
+              <a:rPr lang="en-US" sz="1100" b="0" i="0" u="none" strike="noStrike" cap="none" dirty="0" err="1">
+                <a:solidFill>
+                  <a:srgbClr val="000000"/>
+                </a:solidFill>
+                <a:effectLst/>
+                <a:latin typeface="Arial"/>
+                <a:ea typeface="Arial"/>
+                <a:cs typeface="Arial"/>
+                <a:sym typeface="Arial"/>
+              </a:rPr>
+              <a:t>último</a:t>
+            </a:r>
+            <a:r>
+              <a:rPr lang="en-US" sz="1100" b="0" i="0" u="none" strike="noStrike" cap="none" dirty="0">
+                <a:solidFill>
+                  <a:srgbClr val="000000"/>
+                </a:solidFill>
+                <a:effectLst/>
+                <a:latin typeface="Arial"/>
+                <a:ea typeface="Arial"/>
+                <a:cs typeface="Arial"/>
+                <a:sym typeface="Arial"/>
+              </a:rPr>
+              <a:t> (`and, or, not`).</a:t>
+            </a:r>
+          </a:p>
+          <a:p>
+            <a:pPr marL="0" lvl="0" indent="0" algn="l" rtl="0">
+              <a:spcBef>
+                <a:spcPts val="0"/>
+              </a:spcBef>
+              <a:spcAft>
+                <a:spcPts val="0"/>
+              </a:spcAft>
+              <a:buNone/>
+            </a:pPr>
+            <a:endParaRPr dirty="0"/>
+          </a:p>
+        </p:txBody>
+      </p:sp>
+    </p:spTree>
+    <p:extLst>
+      <p:ext uri="{BB962C8B-B14F-4D97-AF65-F5344CB8AC3E}">
         <p14:creationId xmlns:p14="http://schemas.microsoft.com/office/powerpoint/2010/main" val="1418006360"/>
       </p:ext>
     </p:extLst>
@@ -1426,7 +2459,7 @@
 </p:notes>
 </file>
 
-<file path=ppt/notesSlides/notesSlide7.xml><?xml version="1.0" encoding="utf-8"?>
+<file path=ppt/notesSlides/notesSlide9.xml><?xml version="1.0" encoding="utf-8"?>
 <p:notes xmlns:a="http://schemas.openxmlformats.org/drawingml/2006/main" xmlns:r="http://schemas.openxmlformats.org/officeDocument/2006/relationships" xmlns:p="http://schemas.openxmlformats.org/presentationml/2006/main" showMasterSp="0" showMasterPhAnim="0">
   <p:cSld>
     <p:spTree>
@@ -1528,110 +2561,6 @@
         <p14:creationId xmlns:p14="http://schemas.microsoft.com/office/powerpoint/2010/main" val="2209410683"/>
       </p:ext>
     </p:extLst>
-  </p:cSld>
-  <p:clrMapOvr>
-    <a:masterClrMapping/>
-  </p:clrMapOvr>
-</p:notes>
-</file>
-
-<file path=ppt/notesSlides/notesSlide8.xml><?xml version="1.0" encoding="utf-8"?>
-<p:notes xmlns:a="http://schemas.openxmlformats.org/drawingml/2006/main" xmlns:r="http://schemas.openxmlformats.org/officeDocument/2006/relationships" xmlns:p="http://schemas.openxmlformats.org/presentationml/2006/main" showMasterSp="0" showMasterPhAnim="0">
-  <p:cSld>
-    <p:spTree>
-      <p:nvGrpSpPr>
-        <p:cNvPr id="1" name="Shape 145"/>
-        <p:cNvGrpSpPr/>
-        <p:nvPr/>
-      </p:nvGrpSpPr>
-      <p:grpSpPr>
-        <a:xfrm>
-          <a:off x="0" y="0"/>
-          <a:ext cx="0" cy="0"/>
-          <a:chOff x="0" y="0"/>
-          <a:chExt cx="0" cy="0"/>
-        </a:xfrm>
-      </p:grpSpPr>
-      <p:sp>
-        <p:nvSpPr>
-          <p:cNvPr id="146" name="Google Shape;146;g1059654baf8_0_69:notes"/>
-          <p:cNvSpPr>
-            <a:spLocks noGrp="1" noRot="1" noChangeAspect="1"/>
-          </p:cNvSpPr>
-          <p:nvPr>
-            <p:ph type="sldImg" idx="2"/>
-          </p:nvPr>
-        </p:nvSpPr>
-        <p:spPr>
-          <a:xfrm>
-            <a:off x="381000" y="685800"/>
-            <a:ext cx="6096000" cy="3429000"/>
-          </a:xfrm>
-          <a:custGeom>
-            <a:avLst/>
-            <a:gdLst/>
-            <a:ahLst/>
-            <a:cxnLst/>
-            <a:rect l="l" t="t" r="r" b="b"/>
-            <a:pathLst>
-              <a:path w="120000" h="120000" extrusionOk="0">
-                <a:moveTo>
-                  <a:pt x="0" y="0"/>
-                </a:moveTo>
-                <a:lnTo>
-                  <a:pt x="120000" y="0"/>
-                </a:lnTo>
-                <a:lnTo>
-                  <a:pt x="120000" y="120000"/>
-                </a:lnTo>
-                <a:lnTo>
-                  <a:pt x="0" y="120000"/>
-                </a:lnTo>
-                <a:close/>
-              </a:path>
-            </a:pathLst>
-          </a:custGeom>
-        </p:spPr>
-      </p:sp>
-      <p:sp>
-        <p:nvSpPr>
-          <p:cNvPr id="147" name="Google Shape;147;g1059654baf8_0_69:notes"/>
-          <p:cNvSpPr txBox="1">
-            <a:spLocks noGrp="1"/>
-          </p:cNvSpPr>
-          <p:nvPr>
-            <p:ph type="body" idx="1"/>
-          </p:nvPr>
-        </p:nvSpPr>
-        <p:spPr>
-          <a:xfrm>
-            <a:off x="685800" y="4343400"/>
-            <a:ext cx="5486400" cy="4114800"/>
-          </a:xfrm>
-          <a:prstGeom prst="rect">
-            <a:avLst/>
-          </a:prstGeom>
-        </p:spPr>
-        <p:txBody>
-          <a:bodyPr spcFirstLastPara="1" wrap="square" lIns="91425" tIns="91425" rIns="91425" bIns="91425" anchor="t" anchorCtr="0">
-            <a:noAutofit/>
-          </a:bodyPr>
-          <a:lstStyle/>
-          <a:p>
-            <a:pPr marL="0" lvl="0" indent="0" algn="l" rtl="0">
-              <a:spcBef>
-                <a:spcPts val="0"/>
-              </a:spcBef>
-              <a:spcAft>
-                <a:spcPts val="0"/>
-              </a:spcAft>
-              <a:buNone/>
-            </a:pPr>
-            <a:endParaRPr dirty="0"/>
-          </a:p>
-        </p:txBody>
-      </p:sp>
-    </p:spTree>
   </p:cSld>
   <p:clrMapOvr>
     <a:masterClrMapping/>
@@ -6658,6 +7587,155 @@
           </a:p>
         </p:txBody>
       </p:sp>
+    </p:spTree>
+  </p:cSld>
+  <p:clrMapOvr>
+    <a:masterClrMapping/>
+  </p:clrMapOvr>
+</p:sld>
+</file>
+
+<file path=ppt/slides/slide10.xml><?xml version="1.0" encoding="utf-8"?>
+<p:sld xmlns:a="http://schemas.openxmlformats.org/drawingml/2006/main" xmlns:r="http://schemas.openxmlformats.org/officeDocument/2006/relationships" xmlns:p="http://schemas.openxmlformats.org/presentationml/2006/main">
+  <p:cSld>
+    <p:bg>
+      <p:bgPr>
+        <a:solidFill>
+          <a:srgbClr val="FF609A"/>
+        </a:solidFill>
+        <a:effectLst/>
+      </p:bgPr>
+    </p:bg>
+    <p:spTree>
+      <p:nvGrpSpPr>
+        <p:cNvPr id="1" name="Shape 148"/>
+        <p:cNvGrpSpPr/>
+        <p:nvPr/>
+      </p:nvGrpSpPr>
+      <p:grpSpPr>
+        <a:xfrm>
+          <a:off x="0" y="0"/>
+          <a:ext cx="0" cy="0"/>
+          <a:chOff x="0" y="0"/>
+          <a:chExt cx="0" cy="0"/>
+        </a:xfrm>
+      </p:grpSpPr>
+      <p:pic>
+        <p:nvPicPr>
+          <p:cNvPr id="3" name="Picture 2">
+            <a:extLst>
+              <a:ext uri="{FF2B5EF4-FFF2-40B4-BE49-F238E27FC236}">
+                <a16:creationId xmlns:a16="http://schemas.microsoft.com/office/drawing/2014/main" id="{60981012-8926-224D-A170-BC4DBE994BF8}"/>
+              </a:ext>
+            </a:extLst>
+          </p:cNvPr>
+          <p:cNvPicPr>
+            <a:picLocks noChangeAspect="1"/>
+          </p:cNvPicPr>
+          <p:nvPr/>
+        </p:nvPicPr>
+        <p:blipFill>
+          <a:blip r:embed="rId3"/>
+          <a:stretch>
+            <a:fillRect/>
+          </a:stretch>
+        </p:blipFill>
+        <p:spPr>
+          <a:xfrm>
+            <a:off x="0" y="0"/>
+            <a:ext cx="9144000" cy="5143500"/>
+          </a:xfrm>
+          <a:prstGeom prst="rect">
+            <a:avLst/>
+          </a:prstGeom>
+        </p:spPr>
+      </p:pic>
+      <p:sp>
+        <p:nvSpPr>
+          <p:cNvPr id="152" name="Google Shape;152;p24"/>
+          <p:cNvSpPr txBox="1"/>
+          <p:nvPr/>
+        </p:nvSpPr>
+        <p:spPr>
+          <a:xfrm>
+            <a:off x="450000" y="927425"/>
+            <a:ext cx="4206300" cy="738900"/>
+          </a:xfrm>
+          <a:prstGeom prst="rect">
+            <a:avLst/>
+          </a:prstGeom>
+          <a:noFill/>
+          <a:ln>
+            <a:noFill/>
+          </a:ln>
+        </p:spPr>
+        <p:txBody>
+          <a:bodyPr spcFirstLastPara="1" wrap="square" lIns="91425" tIns="91425" rIns="91425" bIns="91425" anchor="t" anchorCtr="0">
+            <a:spAutoFit/>
+          </a:bodyPr>
+          <a:lstStyle/>
+          <a:p>
+            <a:pPr marL="0" lvl="0" indent="0" algn="l" rtl="0">
+              <a:spcBef>
+                <a:spcPts val="0"/>
+              </a:spcBef>
+              <a:spcAft>
+                <a:spcPts val="0"/>
+              </a:spcAft>
+              <a:buNone/>
+            </a:pPr>
+            <a:r>
+              <a:rPr lang="pt-BR" sz="3600" dirty="0">
+                <a:solidFill>
+                  <a:srgbClr val="FFFFFF"/>
+                </a:solidFill>
+                <a:latin typeface="Montserrat Black"/>
+                <a:ea typeface="Montserrat Black"/>
+                <a:cs typeface="Montserrat Black"/>
+                <a:sym typeface="Montserrat Black"/>
+              </a:rPr>
+              <a:t>Obrigada!</a:t>
+            </a:r>
+            <a:endParaRPr sz="3600" dirty="0">
+              <a:solidFill>
+                <a:srgbClr val="FFFFFF"/>
+              </a:solidFill>
+              <a:latin typeface="Montserrat Black"/>
+              <a:ea typeface="Montserrat Black"/>
+              <a:cs typeface="Montserrat Black"/>
+              <a:sym typeface="Montserrat Black"/>
+            </a:endParaRPr>
+          </a:p>
+        </p:txBody>
+      </p:sp>
+      <p:pic>
+        <p:nvPicPr>
+          <p:cNvPr id="155" name="Google Shape;155;p24"/>
+          <p:cNvPicPr preferRelativeResize="0"/>
+          <p:nvPr/>
+        </p:nvPicPr>
+        <p:blipFill>
+          <a:blip r:embed="rId4">
+            <a:alphaModFix/>
+          </a:blip>
+          <a:stretch>
+            <a:fillRect/>
+          </a:stretch>
+        </p:blipFill>
+        <p:spPr>
+          <a:xfrm>
+            <a:off x="7559263" y="4404125"/>
+            <a:ext cx="1134737" cy="365875"/>
+          </a:xfrm>
+          <a:prstGeom prst="rect">
+            <a:avLst/>
+          </a:prstGeom>
+          <a:noFill/>
+          <a:ln>
+            <a:noFill/>
+          </a:ln>
+        </p:spPr>
+      </p:pic>
     </p:spTree>
   </p:cSld>
   <p:clrMapOvr>
@@ -9600,6 +10678,978 @@
               <a:buNone/>
             </a:pPr>
             <a:r>
+              <a:rPr lang="pt-BR" sz="2400" b="1" dirty="0" err="1">
+                <a:solidFill>
+                  <a:schemeClr val="dk1"/>
+                </a:solidFill>
+                <a:latin typeface="Montserrat"/>
+                <a:ea typeface="Montserrat"/>
+                <a:cs typeface="Montserrat"/>
+                <a:sym typeface="Montserrat"/>
+              </a:rPr>
+              <a:t>Git</a:t>
+            </a:r>
+            <a:endParaRPr lang="pt-BR" sz="2400" b="1" dirty="0">
+              <a:solidFill>
+                <a:schemeClr val="dk1"/>
+              </a:solidFill>
+              <a:latin typeface="Montserrat"/>
+              <a:ea typeface="Montserrat"/>
+              <a:cs typeface="Montserrat"/>
+              <a:sym typeface="Montserrat"/>
+            </a:endParaRPr>
+          </a:p>
+        </p:txBody>
+      </p:sp>
+      <p:pic>
+        <p:nvPicPr>
+          <p:cNvPr id="82" name="Google Shape;82;p16"/>
+          <p:cNvPicPr preferRelativeResize="0"/>
+          <p:nvPr/>
+        </p:nvPicPr>
+        <p:blipFill rotWithShape="1">
+          <a:blip r:embed="rId3">
+            <a:alphaModFix amt="72000"/>
+          </a:blip>
+          <a:srcRect t="42847"/>
+          <a:stretch/>
+        </p:blipFill>
+        <p:spPr>
+          <a:xfrm>
+            <a:off x="8918300" y="1082579"/>
+            <a:ext cx="225700" cy="1662299"/>
+          </a:xfrm>
+          <a:prstGeom prst="rect">
+            <a:avLst/>
+          </a:prstGeom>
+          <a:noFill/>
+          <a:ln>
+            <a:noFill/>
+          </a:ln>
+        </p:spPr>
+      </p:pic>
+      <p:sp>
+        <p:nvSpPr>
+          <p:cNvPr id="5" name="Google Shape;89;p17">
+            <a:extLst>
+              <a:ext uri="{FF2B5EF4-FFF2-40B4-BE49-F238E27FC236}">
+                <a16:creationId xmlns:a16="http://schemas.microsoft.com/office/drawing/2014/main" id="{BC5DFF94-0EC9-8F4E-B342-13F65A51059D}"/>
+              </a:ext>
+            </a:extLst>
+          </p:cNvPr>
+          <p:cNvSpPr txBox="1"/>
+          <p:nvPr/>
+        </p:nvSpPr>
+        <p:spPr>
+          <a:xfrm>
+            <a:off x="308937" y="970720"/>
+            <a:ext cx="8211607" cy="769411"/>
+          </a:xfrm>
+          <a:prstGeom prst="rect">
+            <a:avLst/>
+          </a:prstGeom>
+          <a:noFill/>
+          <a:ln>
+            <a:noFill/>
+          </a:ln>
+        </p:spPr>
+        <p:txBody>
+          <a:bodyPr spcFirstLastPara="1" wrap="square" lIns="91425" tIns="91425" rIns="91425" bIns="91425" anchor="t" anchorCtr="0">
+            <a:spAutoFit/>
+          </a:bodyPr>
+          <a:lstStyle/>
+          <a:p>
+            <a:pPr marL="457200" lvl="0" indent="-342900">
+              <a:spcBef>
+                <a:spcPts val="600"/>
+              </a:spcBef>
+              <a:buClr>
+                <a:srgbClr val="0C343D"/>
+              </a:buClr>
+              <a:buSzPts val="1800"/>
+              <a:buFont typeface="Montserrat"/>
+              <a:buChar char="▹"/>
+            </a:pPr>
+            <a:r>
+              <a:rPr lang="en-US" dirty="0">
+                <a:solidFill>
+                  <a:schemeClr val="dk1"/>
+                </a:solidFill>
+                <a:latin typeface="Montserrat"/>
+                <a:ea typeface="Montserrat"/>
+                <a:cs typeface="Montserrat"/>
+                <a:sym typeface="Montserrat"/>
+              </a:rPr>
+              <a:t>Como </a:t>
+            </a:r>
+            <a:r>
+              <a:rPr lang="en-US" dirty="0" err="1">
+                <a:solidFill>
+                  <a:schemeClr val="dk1"/>
+                </a:solidFill>
+                <a:latin typeface="Montserrat"/>
+                <a:ea typeface="Montserrat"/>
+                <a:cs typeface="Montserrat"/>
+                <a:sym typeface="Montserrat"/>
+              </a:rPr>
+              <a:t>atualizo</a:t>
+            </a:r>
+            <a:r>
+              <a:rPr lang="en-US" dirty="0">
+                <a:solidFill>
+                  <a:schemeClr val="dk1"/>
+                </a:solidFill>
+                <a:latin typeface="Montserrat"/>
+                <a:ea typeface="Montserrat"/>
+                <a:cs typeface="Montserrat"/>
+                <a:sym typeface="Montserrat"/>
+              </a:rPr>
+              <a:t> o meu fork com o </a:t>
+            </a:r>
+            <a:r>
+              <a:rPr lang="en-US" dirty="0" err="1">
+                <a:solidFill>
+                  <a:schemeClr val="dk1"/>
+                </a:solidFill>
+                <a:latin typeface="Montserrat"/>
+                <a:ea typeface="Montserrat"/>
+                <a:cs typeface="Montserrat"/>
+                <a:sym typeface="Montserrat"/>
+              </a:rPr>
+              <a:t>conteúdo</a:t>
+            </a:r>
+            <a:r>
+              <a:rPr lang="en-US" dirty="0">
+                <a:solidFill>
+                  <a:schemeClr val="dk1"/>
+                </a:solidFill>
+                <a:latin typeface="Montserrat"/>
+                <a:ea typeface="Montserrat"/>
+                <a:cs typeface="Montserrat"/>
+                <a:sym typeface="Montserrat"/>
+              </a:rPr>
+              <a:t> da </a:t>
+            </a:r>
+            <a:r>
+              <a:rPr lang="en-US" dirty="0" err="1">
+                <a:solidFill>
+                  <a:schemeClr val="dk1"/>
+                </a:solidFill>
+                <a:latin typeface="Montserrat"/>
+                <a:ea typeface="Montserrat"/>
+                <a:cs typeface="Montserrat"/>
+                <a:sym typeface="Montserrat"/>
+              </a:rPr>
+              <a:t>próxima</a:t>
+            </a:r>
+            <a:r>
+              <a:rPr lang="en-US" dirty="0">
+                <a:solidFill>
+                  <a:schemeClr val="dk1"/>
+                </a:solidFill>
+                <a:latin typeface="Montserrat"/>
+                <a:ea typeface="Montserrat"/>
+                <a:cs typeface="Montserrat"/>
+                <a:sym typeface="Montserrat"/>
+              </a:rPr>
+              <a:t> aula?</a:t>
+            </a:r>
+          </a:p>
+          <a:p>
+            <a:pPr marL="457200" lvl="0" indent="-342900">
+              <a:spcBef>
+                <a:spcPts val="600"/>
+              </a:spcBef>
+              <a:buClr>
+                <a:srgbClr val="0C343D"/>
+              </a:buClr>
+              <a:buSzPts val="1800"/>
+              <a:buFont typeface="Montserrat"/>
+              <a:buChar char="▹"/>
+            </a:pPr>
+            <a:endParaRPr lang="en-US" dirty="0">
+              <a:solidFill>
+                <a:schemeClr val="dk1"/>
+              </a:solidFill>
+              <a:latin typeface="Montserrat"/>
+              <a:ea typeface="Montserrat"/>
+              <a:cs typeface="Montserrat"/>
+              <a:sym typeface="Montserrat"/>
+            </a:endParaRPr>
+          </a:p>
+        </p:txBody>
+      </p:sp>
+      <p:pic>
+        <p:nvPicPr>
+          <p:cNvPr id="2" name="Picture 1">
+            <a:extLst>
+              <a:ext uri="{FF2B5EF4-FFF2-40B4-BE49-F238E27FC236}">
+                <a16:creationId xmlns:a16="http://schemas.microsoft.com/office/drawing/2014/main" id="{B834FCE9-D581-C34D-8CC6-D54AA37BF540}"/>
+              </a:ext>
+            </a:extLst>
+          </p:cNvPr>
+          <p:cNvPicPr>
+            <a:picLocks noChangeAspect="1"/>
+          </p:cNvPicPr>
+          <p:nvPr/>
+        </p:nvPicPr>
+        <p:blipFill>
+          <a:blip r:embed="rId4"/>
+          <a:stretch>
+            <a:fillRect/>
+          </a:stretch>
+        </p:blipFill>
+        <p:spPr>
+          <a:xfrm>
+            <a:off x="1283612" y="1740131"/>
+            <a:ext cx="6262255" cy="2656979"/>
+          </a:xfrm>
+          <a:prstGeom prst="rect">
+            <a:avLst/>
+          </a:prstGeom>
+        </p:spPr>
+      </p:pic>
+      <p:sp>
+        <p:nvSpPr>
+          <p:cNvPr id="3" name="Rounded Rectangle 2">
+            <a:extLst>
+              <a:ext uri="{FF2B5EF4-FFF2-40B4-BE49-F238E27FC236}">
+                <a16:creationId xmlns:a16="http://schemas.microsoft.com/office/drawing/2014/main" id="{13EE06F6-6231-7F42-BF9A-8E502E8DD9A2}"/>
+              </a:ext>
+            </a:extLst>
+          </p:cNvPr>
+          <p:cNvSpPr/>
+          <p:nvPr/>
+        </p:nvSpPr>
+        <p:spPr>
+          <a:xfrm>
+            <a:off x="4765964" y="3338945"/>
+            <a:ext cx="803563" cy="235527"/>
+          </a:xfrm>
+          <a:prstGeom prst="roundRect">
+            <a:avLst/>
+          </a:prstGeom>
+          <a:noFill/>
+          <a:ln>
+            <a:solidFill>
+              <a:srgbClr val="FA609B"/>
+            </a:solidFill>
+          </a:ln>
+        </p:spPr>
+        <p:style>
+          <a:lnRef idx="2">
+            <a:schemeClr val="accent1">
+              <a:shade val="50000"/>
+            </a:schemeClr>
+          </a:lnRef>
+          <a:fillRef idx="1">
+            <a:schemeClr val="accent1"/>
+          </a:fillRef>
+          <a:effectRef idx="0">
+            <a:schemeClr val="accent1"/>
+          </a:effectRef>
+          <a:fontRef idx="minor">
+            <a:schemeClr val="lt1"/>
+          </a:fontRef>
+        </p:style>
+        <p:txBody>
+          <a:bodyPr rtlCol="0" anchor="ctr"/>
+          <a:lstStyle/>
+          <a:p>
+            <a:pPr algn="ctr"/>
+            <a:endParaRPr lang="en-BR"/>
+          </a:p>
+        </p:txBody>
+      </p:sp>
+      <p:sp>
+        <p:nvSpPr>
+          <p:cNvPr id="8" name="Rounded Rectangle 7">
+            <a:extLst>
+              <a:ext uri="{FF2B5EF4-FFF2-40B4-BE49-F238E27FC236}">
+                <a16:creationId xmlns:a16="http://schemas.microsoft.com/office/drawing/2014/main" id="{2082E931-A858-E14F-84D7-F704AD391681}"/>
+              </a:ext>
+            </a:extLst>
+          </p:cNvPr>
+          <p:cNvSpPr/>
+          <p:nvPr/>
+        </p:nvSpPr>
+        <p:spPr>
+          <a:xfrm>
+            <a:off x="1778393" y="2571750"/>
+            <a:ext cx="2544225" cy="296142"/>
+          </a:xfrm>
+          <a:prstGeom prst="roundRect">
+            <a:avLst/>
+          </a:prstGeom>
+          <a:noFill/>
+          <a:ln>
+            <a:solidFill>
+              <a:srgbClr val="FA609B"/>
+            </a:solidFill>
+          </a:ln>
+        </p:spPr>
+        <p:style>
+          <a:lnRef idx="2">
+            <a:schemeClr val="accent1">
+              <a:shade val="50000"/>
+            </a:schemeClr>
+          </a:lnRef>
+          <a:fillRef idx="1">
+            <a:schemeClr val="accent1"/>
+          </a:fillRef>
+          <a:effectRef idx="0">
+            <a:schemeClr val="accent1"/>
+          </a:effectRef>
+          <a:fontRef idx="minor">
+            <a:schemeClr val="lt1"/>
+          </a:fontRef>
+        </p:style>
+        <p:txBody>
+          <a:bodyPr rtlCol="0" anchor="ctr"/>
+          <a:lstStyle/>
+          <a:p>
+            <a:pPr algn="ctr"/>
+            <a:endParaRPr lang="en-BR"/>
+          </a:p>
+        </p:txBody>
+      </p:sp>
+    </p:spTree>
+    <p:extLst>
+      <p:ext uri="{BB962C8B-B14F-4D97-AF65-F5344CB8AC3E}">
+        <p14:creationId xmlns:p14="http://schemas.microsoft.com/office/powerpoint/2010/main" val="1654719359"/>
+      </p:ext>
+    </p:extLst>
+  </p:cSld>
+  <p:clrMapOvr>
+    <a:masterClrMapping/>
+  </p:clrMapOvr>
+</p:sld>
+</file>
+
+<file path=ppt/slides/slide6.xml><?xml version="1.0" encoding="utf-8"?>
+<p:sld xmlns:a="http://schemas.openxmlformats.org/drawingml/2006/main" xmlns:r="http://schemas.openxmlformats.org/officeDocument/2006/relationships" xmlns:p="http://schemas.openxmlformats.org/presentationml/2006/main">
+  <p:cSld>
+    <p:spTree>
+      <p:nvGrpSpPr>
+        <p:cNvPr id="1" name="Shape 78"/>
+        <p:cNvGrpSpPr/>
+        <p:nvPr/>
+      </p:nvGrpSpPr>
+      <p:grpSpPr>
+        <a:xfrm>
+          <a:off x="0" y="0"/>
+          <a:ext cx="0" cy="0"/>
+          <a:chOff x="0" y="0"/>
+          <a:chExt cx="0" cy="0"/>
+        </a:xfrm>
+      </p:grpSpPr>
+      <p:sp>
+        <p:nvSpPr>
+          <p:cNvPr id="79" name="Google Shape;79;p16"/>
+          <p:cNvSpPr txBox="1"/>
+          <p:nvPr/>
+        </p:nvSpPr>
+        <p:spPr>
+          <a:xfrm>
+            <a:off x="385616" y="391552"/>
+            <a:ext cx="6276900" cy="553968"/>
+          </a:xfrm>
+          <a:prstGeom prst="rect">
+            <a:avLst/>
+          </a:prstGeom>
+          <a:noFill/>
+          <a:ln>
+            <a:noFill/>
+          </a:ln>
+        </p:spPr>
+        <p:txBody>
+          <a:bodyPr spcFirstLastPara="1" wrap="square" lIns="91425" tIns="91425" rIns="91425" bIns="91425" anchor="t" anchorCtr="0">
+            <a:spAutoFit/>
+          </a:bodyPr>
+          <a:lstStyle/>
+          <a:p>
+            <a:pPr marL="0" lvl="0" indent="0" algn="l" rtl="0">
+              <a:spcBef>
+                <a:spcPts val="0"/>
+              </a:spcBef>
+              <a:spcAft>
+                <a:spcPts val="0"/>
+              </a:spcAft>
+              <a:buNone/>
+            </a:pPr>
+            <a:r>
+              <a:rPr lang="pt-BR" sz="2400" b="1" dirty="0" err="1">
+                <a:solidFill>
+                  <a:schemeClr val="dk1"/>
+                </a:solidFill>
+                <a:latin typeface="Montserrat"/>
+                <a:ea typeface="Montserrat"/>
+                <a:cs typeface="Montserrat"/>
+                <a:sym typeface="Montserrat"/>
+              </a:rPr>
+              <a:t>Git</a:t>
+            </a:r>
+            <a:r>
+              <a:rPr lang="pt-BR" sz="2400" b="1" dirty="0">
+                <a:solidFill>
+                  <a:schemeClr val="dk1"/>
+                </a:solidFill>
+                <a:latin typeface="Montserrat"/>
+                <a:ea typeface="Montserrat"/>
+                <a:cs typeface="Montserrat"/>
+                <a:sym typeface="Montserrat"/>
+              </a:rPr>
+              <a:t> – Como atualizar meu </a:t>
+            </a:r>
+            <a:r>
+              <a:rPr lang="pt-BR" sz="2400" b="1" dirty="0" err="1">
+                <a:solidFill>
+                  <a:schemeClr val="dk1"/>
+                </a:solidFill>
+                <a:latin typeface="Montserrat"/>
+                <a:ea typeface="Montserrat"/>
+                <a:cs typeface="Montserrat"/>
+                <a:sym typeface="Montserrat"/>
+              </a:rPr>
+              <a:t>repo</a:t>
+            </a:r>
+            <a:r>
+              <a:rPr lang="pt-BR" sz="2400" b="1" dirty="0">
+                <a:solidFill>
+                  <a:schemeClr val="dk1"/>
+                </a:solidFill>
+                <a:latin typeface="Montserrat"/>
+                <a:ea typeface="Montserrat"/>
+                <a:cs typeface="Montserrat"/>
+                <a:sym typeface="Montserrat"/>
+              </a:rPr>
+              <a:t>?</a:t>
+            </a:r>
+          </a:p>
+        </p:txBody>
+      </p:sp>
+      <p:pic>
+        <p:nvPicPr>
+          <p:cNvPr id="82" name="Google Shape;82;p16"/>
+          <p:cNvPicPr preferRelativeResize="0"/>
+          <p:nvPr/>
+        </p:nvPicPr>
+        <p:blipFill rotWithShape="1">
+          <a:blip r:embed="rId3">
+            <a:alphaModFix amt="72000"/>
+          </a:blip>
+          <a:srcRect t="42847"/>
+          <a:stretch/>
+        </p:blipFill>
+        <p:spPr>
+          <a:xfrm>
+            <a:off x="8918300" y="1082579"/>
+            <a:ext cx="225700" cy="1662299"/>
+          </a:xfrm>
+          <a:prstGeom prst="rect">
+            <a:avLst/>
+          </a:prstGeom>
+          <a:noFill/>
+          <a:ln>
+            <a:noFill/>
+          </a:ln>
+        </p:spPr>
+      </p:pic>
+      <p:sp>
+        <p:nvSpPr>
+          <p:cNvPr id="4" name="Rectangle 3">
+            <a:extLst>
+              <a:ext uri="{FF2B5EF4-FFF2-40B4-BE49-F238E27FC236}">
+                <a16:creationId xmlns:a16="http://schemas.microsoft.com/office/drawing/2014/main" id="{2A670943-5C9E-8445-95AC-1854378E71F0}"/>
+              </a:ext>
+            </a:extLst>
+          </p:cNvPr>
+          <p:cNvSpPr/>
+          <p:nvPr/>
+        </p:nvSpPr>
+        <p:spPr>
+          <a:xfrm>
+            <a:off x="2213687" y="2451416"/>
+            <a:ext cx="4448829" cy="1600438"/>
+          </a:xfrm>
+          <a:prstGeom prst="rect">
+            <a:avLst/>
+          </a:prstGeom>
+          <a:solidFill>
+            <a:schemeClr val="accent2"/>
+          </a:solidFill>
+        </p:spPr>
+        <p:txBody>
+          <a:bodyPr wrap="square">
+            <a:spAutoFit/>
+          </a:bodyPr>
+          <a:lstStyle/>
+          <a:p>
+            <a:r>
+              <a:rPr lang="en-US" dirty="0">
+                <a:solidFill>
+                  <a:schemeClr val="bg1"/>
+                </a:solidFill>
+                <a:latin typeface="Consolas" panose="020B0609020204030204" pitchFamily="49" charset="0"/>
+                <a:cs typeface="Consolas" panose="020B0609020204030204" pitchFamily="49" charset="0"/>
+              </a:rPr>
+              <a:t>cd &lt;</a:t>
+            </a:r>
+            <a:r>
+              <a:rPr lang="en-US" dirty="0" err="1">
+                <a:solidFill>
+                  <a:schemeClr val="bg1"/>
+                </a:solidFill>
+                <a:latin typeface="Consolas" panose="020B0609020204030204" pitchFamily="49" charset="0"/>
+                <a:cs typeface="Consolas" panose="020B0609020204030204" pitchFamily="49" charset="0"/>
+              </a:rPr>
+              <a:t>seu</a:t>
+            </a:r>
+            <a:r>
+              <a:rPr lang="en-US" dirty="0">
+                <a:solidFill>
+                  <a:schemeClr val="bg1"/>
+                </a:solidFill>
+                <a:latin typeface="Consolas" panose="020B0609020204030204" pitchFamily="49" charset="0"/>
+                <a:cs typeface="Consolas" panose="020B0609020204030204" pitchFamily="49" charset="0"/>
+              </a:rPr>
+              <a:t> repo local&gt;</a:t>
+            </a:r>
+            <a:br>
+              <a:rPr lang="en-US" dirty="0">
+                <a:solidFill>
+                  <a:schemeClr val="bg1"/>
+                </a:solidFill>
+                <a:latin typeface="Consolas" panose="020B0609020204030204" pitchFamily="49" charset="0"/>
+                <a:cs typeface="Consolas" panose="020B0609020204030204" pitchFamily="49" charset="0"/>
+              </a:rPr>
+            </a:br>
+            <a:r>
+              <a:rPr lang="en-US" dirty="0">
+                <a:solidFill>
+                  <a:schemeClr val="bg1"/>
+                </a:solidFill>
+                <a:latin typeface="Consolas" panose="020B0609020204030204" pitchFamily="49" charset="0"/>
+                <a:cs typeface="Consolas" panose="020B0609020204030204" pitchFamily="49" charset="0"/>
+              </a:rPr>
+              <a:t>&lt;</a:t>
+            </a:r>
+            <a:r>
+              <a:rPr lang="en-US" dirty="0" err="1">
+                <a:solidFill>
+                  <a:schemeClr val="bg1"/>
+                </a:solidFill>
+                <a:latin typeface="Consolas" panose="020B0609020204030204" pitchFamily="49" charset="0"/>
+                <a:cs typeface="Consolas" panose="020B0609020204030204" pitchFamily="49" charset="0"/>
+              </a:rPr>
+              <a:t>edite</a:t>
+            </a:r>
+            <a:r>
+              <a:rPr lang="en-US" dirty="0">
+                <a:solidFill>
+                  <a:schemeClr val="bg1"/>
+                </a:solidFill>
+                <a:latin typeface="Consolas" panose="020B0609020204030204" pitchFamily="49" charset="0"/>
+                <a:cs typeface="Consolas" panose="020B0609020204030204" pitchFamily="49" charset="0"/>
+              </a:rPr>
+              <a:t> o </a:t>
+            </a:r>
+            <a:r>
+              <a:rPr lang="en-US" dirty="0" err="1">
+                <a:solidFill>
+                  <a:schemeClr val="bg1"/>
+                </a:solidFill>
+                <a:latin typeface="Consolas" panose="020B0609020204030204" pitchFamily="49" charset="0"/>
+                <a:cs typeface="Consolas" panose="020B0609020204030204" pitchFamily="49" charset="0"/>
+              </a:rPr>
+              <a:t>README.md</a:t>
+            </a:r>
+            <a:r>
+              <a:rPr lang="en-US" dirty="0">
+                <a:solidFill>
+                  <a:schemeClr val="bg1"/>
+                </a:solidFill>
+                <a:latin typeface="Consolas" panose="020B0609020204030204" pitchFamily="49" charset="0"/>
+                <a:cs typeface="Consolas" panose="020B0609020204030204" pitchFamily="49" charset="0"/>
+              </a:rPr>
+              <a:t>&gt;</a:t>
+            </a:r>
+          </a:p>
+          <a:p>
+            <a:r>
+              <a:rPr lang="en-US" dirty="0">
+                <a:solidFill>
+                  <a:schemeClr val="bg1"/>
+                </a:solidFill>
+                <a:latin typeface="Consolas" panose="020B0609020204030204" pitchFamily="49" charset="0"/>
+                <a:cs typeface="Consolas" panose="020B0609020204030204" pitchFamily="49" charset="0"/>
+              </a:rPr>
+              <a:t>git stage </a:t>
+            </a:r>
+            <a:r>
+              <a:rPr lang="en-US" dirty="0" err="1">
+                <a:solidFill>
+                  <a:schemeClr val="bg1"/>
+                </a:solidFill>
+                <a:latin typeface="Consolas" panose="020B0609020204030204" pitchFamily="49" charset="0"/>
+                <a:cs typeface="Consolas" panose="020B0609020204030204" pitchFamily="49" charset="0"/>
+              </a:rPr>
+              <a:t>README.md</a:t>
+            </a:r>
+            <a:endParaRPr lang="en-US" dirty="0">
+              <a:solidFill>
+                <a:schemeClr val="bg1"/>
+              </a:solidFill>
+              <a:latin typeface="Consolas" panose="020B0609020204030204" pitchFamily="49" charset="0"/>
+              <a:cs typeface="Consolas" panose="020B0609020204030204" pitchFamily="49" charset="0"/>
+            </a:endParaRPr>
+          </a:p>
+          <a:p>
+            <a:r>
+              <a:rPr lang="en-US" dirty="0">
+                <a:solidFill>
+                  <a:schemeClr val="bg1"/>
+                </a:solidFill>
+                <a:latin typeface="Consolas" panose="020B0609020204030204" pitchFamily="49" charset="0"/>
+                <a:cs typeface="Consolas" panose="020B0609020204030204" pitchFamily="49" charset="0"/>
+              </a:rPr>
+              <a:t>git stage aula01/04_desafio_1.py</a:t>
+            </a:r>
+          </a:p>
+          <a:p>
+            <a:r>
+              <a:rPr lang="en-US" dirty="0">
+                <a:solidFill>
+                  <a:schemeClr val="bg1"/>
+                </a:solidFill>
+                <a:latin typeface="Consolas" panose="020B0609020204030204" pitchFamily="49" charset="0"/>
+                <a:cs typeface="Consolas" panose="020B0609020204030204" pitchFamily="49" charset="0"/>
+              </a:rPr>
+              <a:t>git stage aula01/07_desafio_2.py</a:t>
+            </a:r>
+          </a:p>
+          <a:p>
+            <a:r>
+              <a:rPr lang="en-US" dirty="0">
+                <a:solidFill>
+                  <a:schemeClr val="bg1"/>
+                </a:solidFill>
+                <a:latin typeface="Consolas" panose="020B0609020204030204" pitchFamily="49" charset="0"/>
+                <a:cs typeface="Consolas" panose="020B0609020204030204" pitchFamily="49" charset="0"/>
+              </a:rPr>
+              <a:t>git commit –m “</a:t>
+            </a:r>
+            <a:r>
+              <a:rPr lang="en-US" dirty="0" err="1">
+                <a:solidFill>
+                  <a:schemeClr val="bg1"/>
+                </a:solidFill>
+                <a:latin typeface="Consolas" panose="020B0609020204030204" pitchFamily="49" charset="0"/>
+                <a:cs typeface="Consolas" panose="020B0609020204030204" pitchFamily="49" charset="0"/>
+              </a:rPr>
+              <a:t>Primeiros</a:t>
+            </a:r>
+            <a:r>
+              <a:rPr lang="en-US" dirty="0">
+                <a:solidFill>
+                  <a:schemeClr val="bg1"/>
+                </a:solidFill>
+                <a:latin typeface="Consolas" panose="020B0609020204030204" pitchFamily="49" charset="0"/>
+                <a:cs typeface="Consolas" panose="020B0609020204030204" pitchFamily="49" charset="0"/>
+              </a:rPr>
+              <a:t> commits – Aula 01”</a:t>
+            </a:r>
+          </a:p>
+          <a:p>
+            <a:r>
+              <a:rPr lang="en-US" dirty="0">
+                <a:solidFill>
+                  <a:schemeClr val="bg1"/>
+                </a:solidFill>
+                <a:latin typeface="Consolas" panose="020B0609020204030204" pitchFamily="49" charset="0"/>
+                <a:cs typeface="Consolas" panose="020B0609020204030204" pitchFamily="49" charset="0"/>
+              </a:rPr>
+              <a:t>git push</a:t>
+            </a:r>
+          </a:p>
+        </p:txBody>
+      </p:sp>
+      <p:sp>
+        <p:nvSpPr>
+          <p:cNvPr id="5" name="Google Shape;89;p17">
+            <a:extLst>
+              <a:ext uri="{FF2B5EF4-FFF2-40B4-BE49-F238E27FC236}">
+                <a16:creationId xmlns:a16="http://schemas.microsoft.com/office/drawing/2014/main" id="{BC5DFF94-0EC9-8F4E-B342-13F65A51059D}"/>
+              </a:ext>
+            </a:extLst>
+          </p:cNvPr>
+          <p:cNvSpPr txBox="1"/>
+          <p:nvPr/>
+        </p:nvSpPr>
+        <p:spPr>
+          <a:xfrm>
+            <a:off x="308937" y="970720"/>
+            <a:ext cx="8211607" cy="1061799"/>
+          </a:xfrm>
+          <a:prstGeom prst="rect">
+            <a:avLst/>
+          </a:prstGeom>
+          <a:noFill/>
+          <a:ln>
+            <a:noFill/>
+          </a:ln>
+        </p:spPr>
+        <p:txBody>
+          <a:bodyPr spcFirstLastPara="1" wrap="square" lIns="91425" tIns="91425" rIns="91425" bIns="91425" anchor="t" anchorCtr="0">
+            <a:spAutoFit/>
+          </a:bodyPr>
+          <a:lstStyle/>
+          <a:p>
+            <a:pPr marL="457200" lvl="0" indent="-342900">
+              <a:spcBef>
+                <a:spcPts val="600"/>
+              </a:spcBef>
+              <a:buClr>
+                <a:srgbClr val="0C343D"/>
+              </a:buClr>
+              <a:buSzPts val="1800"/>
+              <a:buFont typeface="Montserrat"/>
+              <a:buChar char="▹"/>
+            </a:pPr>
+            <a:r>
+              <a:rPr lang="en-US" dirty="0" err="1">
+                <a:solidFill>
+                  <a:schemeClr val="dk1"/>
+                </a:solidFill>
+                <a:latin typeface="Montserrat"/>
+                <a:ea typeface="Montserrat"/>
+                <a:cs typeface="Montserrat"/>
+                <a:sym typeface="Montserrat"/>
+              </a:rPr>
+              <a:t>Primeiros</a:t>
+            </a:r>
+            <a:r>
+              <a:rPr lang="en-US" dirty="0">
+                <a:solidFill>
+                  <a:schemeClr val="dk1"/>
+                </a:solidFill>
+                <a:latin typeface="Montserrat"/>
+                <a:ea typeface="Montserrat"/>
+                <a:cs typeface="Montserrat"/>
+                <a:sym typeface="Montserrat"/>
+              </a:rPr>
+              <a:t> commits:</a:t>
+            </a:r>
+          </a:p>
+          <a:p>
+            <a:pPr marL="114300" lvl="4">
+              <a:spcBef>
+                <a:spcPts val="600"/>
+              </a:spcBef>
+              <a:buClr>
+                <a:srgbClr val="0C343D"/>
+              </a:buClr>
+              <a:buSzPts val="1800"/>
+            </a:pPr>
+            <a:r>
+              <a:rPr lang="en-US" dirty="0" err="1">
+                <a:solidFill>
+                  <a:schemeClr val="dk1"/>
+                </a:solidFill>
+                <a:latin typeface="Montserrat"/>
+                <a:ea typeface="Montserrat"/>
+                <a:cs typeface="Montserrat"/>
+                <a:sym typeface="Montserrat"/>
+              </a:rPr>
+              <a:t>Adicione</a:t>
+            </a:r>
+            <a:r>
+              <a:rPr lang="en-US" dirty="0">
+                <a:solidFill>
+                  <a:schemeClr val="dk1"/>
+                </a:solidFill>
+                <a:latin typeface="Montserrat"/>
+                <a:ea typeface="Montserrat"/>
+                <a:cs typeface="Montserrat"/>
+                <a:sym typeface="Montserrat"/>
+              </a:rPr>
+              <a:t> </a:t>
+            </a:r>
+            <a:r>
+              <a:rPr lang="en-US" dirty="0" err="1">
+                <a:solidFill>
+                  <a:schemeClr val="dk1"/>
+                </a:solidFill>
+                <a:latin typeface="Montserrat"/>
+                <a:ea typeface="Montserrat"/>
+                <a:cs typeface="Montserrat"/>
+                <a:sym typeface="Montserrat"/>
+              </a:rPr>
+              <a:t>seu</a:t>
+            </a:r>
+            <a:r>
+              <a:rPr lang="en-US" dirty="0">
+                <a:solidFill>
+                  <a:schemeClr val="dk1"/>
+                </a:solidFill>
+                <a:latin typeface="Montserrat"/>
+                <a:ea typeface="Montserrat"/>
+                <a:cs typeface="Montserrat"/>
+                <a:sym typeface="Montserrat"/>
+              </a:rPr>
+              <a:t> </a:t>
+            </a:r>
+            <a:r>
+              <a:rPr lang="en-US" dirty="0" err="1">
+                <a:solidFill>
+                  <a:schemeClr val="dk1"/>
+                </a:solidFill>
+                <a:latin typeface="Montserrat"/>
+                <a:ea typeface="Montserrat"/>
+                <a:cs typeface="Montserrat"/>
+                <a:sym typeface="Montserrat"/>
+              </a:rPr>
+              <a:t>nome</a:t>
+            </a:r>
+            <a:r>
+              <a:rPr lang="en-US" dirty="0">
+                <a:solidFill>
+                  <a:schemeClr val="dk1"/>
+                </a:solidFill>
+                <a:latin typeface="Montserrat"/>
+                <a:ea typeface="Montserrat"/>
+                <a:cs typeface="Montserrat"/>
+                <a:sym typeface="Montserrat"/>
+              </a:rPr>
+              <a:t> </a:t>
+            </a:r>
+            <a:r>
+              <a:rPr lang="en-US" dirty="0" err="1">
+                <a:solidFill>
+                  <a:schemeClr val="dk1"/>
+                </a:solidFill>
+                <a:latin typeface="Montserrat"/>
+                <a:ea typeface="Montserrat"/>
+                <a:cs typeface="Montserrat"/>
+                <a:sym typeface="Montserrat"/>
+              </a:rPr>
+              <a:t>ao</a:t>
+            </a:r>
+            <a:r>
+              <a:rPr lang="en-US" dirty="0">
+                <a:solidFill>
+                  <a:schemeClr val="dk1"/>
+                </a:solidFill>
+                <a:latin typeface="Montserrat"/>
+                <a:ea typeface="Montserrat"/>
+                <a:cs typeface="Montserrat"/>
+                <a:sym typeface="Montserrat"/>
+              </a:rPr>
+              <a:t> README</a:t>
+            </a:r>
+          </a:p>
+          <a:p>
+            <a:pPr marL="114300" lvl="4">
+              <a:spcBef>
+                <a:spcPts val="600"/>
+              </a:spcBef>
+              <a:buClr>
+                <a:srgbClr val="0C343D"/>
+              </a:buClr>
+              <a:buSzPts val="1800"/>
+            </a:pPr>
+            <a:r>
+              <a:rPr lang="en-US" dirty="0" err="1">
+                <a:solidFill>
+                  <a:schemeClr val="dk1"/>
+                </a:solidFill>
+                <a:latin typeface="Montserrat"/>
+                <a:ea typeface="Montserrat"/>
+                <a:cs typeface="Montserrat"/>
+                <a:sym typeface="Montserrat"/>
+              </a:rPr>
+              <a:t>Exercícios</a:t>
+            </a:r>
+            <a:r>
+              <a:rPr lang="en-US" dirty="0">
+                <a:solidFill>
+                  <a:schemeClr val="dk1"/>
+                </a:solidFill>
+                <a:latin typeface="Montserrat"/>
+                <a:ea typeface="Montserrat"/>
+                <a:cs typeface="Montserrat"/>
+                <a:sym typeface="Montserrat"/>
+              </a:rPr>
+              <a:t> da aula 01</a:t>
+            </a:r>
+          </a:p>
+        </p:txBody>
+      </p:sp>
+    </p:spTree>
+    <p:extLst>
+      <p:ext uri="{BB962C8B-B14F-4D97-AF65-F5344CB8AC3E}">
+        <p14:creationId xmlns:p14="http://schemas.microsoft.com/office/powerpoint/2010/main" val="2366587667"/>
+      </p:ext>
+    </p:extLst>
+  </p:cSld>
+  <p:clrMapOvr>
+    <a:masterClrMapping/>
+  </p:clrMapOvr>
+</p:sld>
+</file>
+
+<file path=ppt/slides/slide7.xml><?xml version="1.0" encoding="utf-8"?>
+<p:sld xmlns:a="http://schemas.openxmlformats.org/drawingml/2006/main" xmlns:r="http://schemas.openxmlformats.org/officeDocument/2006/relationships" xmlns:p="http://schemas.openxmlformats.org/presentationml/2006/main">
+  <p:cSld>
+    <p:spTree>
+      <p:nvGrpSpPr>
+        <p:cNvPr id="1" name="Shape 78"/>
+        <p:cNvGrpSpPr/>
+        <p:nvPr/>
+      </p:nvGrpSpPr>
+      <p:grpSpPr>
+        <a:xfrm>
+          <a:off x="0" y="0"/>
+          <a:ext cx="0" cy="0"/>
+          <a:chOff x="0" y="0"/>
+          <a:chExt cx="0" cy="0"/>
+        </a:xfrm>
+      </p:grpSpPr>
+      <p:sp>
+        <p:nvSpPr>
+          <p:cNvPr id="79" name="Google Shape;79;p16"/>
+          <p:cNvSpPr txBox="1"/>
+          <p:nvPr/>
+        </p:nvSpPr>
+        <p:spPr>
+          <a:xfrm>
+            <a:off x="385616" y="391552"/>
+            <a:ext cx="6276900" cy="553968"/>
+          </a:xfrm>
+          <a:prstGeom prst="rect">
+            <a:avLst/>
+          </a:prstGeom>
+          <a:noFill/>
+          <a:ln>
+            <a:noFill/>
+          </a:ln>
+        </p:spPr>
+        <p:txBody>
+          <a:bodyPr spcFirstLastPara="1" wrap="square" lIns="91425" tIns="91425" rIns="91425" bIns="91425" anchor="t" anchorCtr="0">
+            <a:spAutoFit/>
+          </a:bodyPr>
+          <a:lstStyle/>
+          <a:p>
+            <a:pPr marL="0" lvl="0" indent="0" algn="l" rtl="0">
+              <a:spcBef>
+                <a:spcPts val="0"/>
+              </a:spcBef>
+              <a:spcAft>
+                <a:spcPts val="0"/>
+              </a:spcAft>
+              <a:buNone/>
+            </a:pPr>
+            <a:r>
               <a:rPr lang="pt-BR" sz="2400" b="1" dirty="0">
                 <a:solidFill>
                   <a:schemeClr val="dk1"/>
@@ -9644,7 +11694,7 @@
     </p:spTree>
     <p:extLst>
       <p:ext uri="{BB962C8B-B14F-4D97-AF65-F5344CB8AC3E}">
-        <p14:creationId xmlns:p14="http://schemas.microsoft.com/office/powerpoint/2010/main" val="1654719359"/>
+        <p14:creationId xmlns:p14="http://schemas.microsoft.com/office/powerpoint/2010/main" val="28684181"/>
       </p:ext>
     </p:extLst>
   </p:cSld>
@@ -9654,7 +11704,7 @@
 </p:sld>
 </file>
 
-<file path=ppt/slides/slide6.xml><?xml version="1.0" encoding="utf-8"?>
+<file path=ppt/slides/slide8.xml><?xml version="1.0" encoding="utf-8"?>
 <p:sld xmlns:a="http://schemas.openxmlformats.org/drawingml/2006/main" xmlns:r="http://schemas.openxmlformats.org/officeDocument/2006/relationships" xmlns:p="http://schemas.openxmlformats.org/presentationml/2006/main">
   <p:cSld>
     <p:spTree>
@@ -11019,7 +13069,7 @@
 </p:sld>
 </file>
 
-<file path=ppt/slides/slide7.xml><?xml version="1.0" encoding="utf-8"?>
+<file path=ppt/slides/slide9.xml><?xml version="1.0" encoding="utf-8"?>
 <p:sld xmlns:a="http://schemas.openxmlformats.org/drawingml/2006/main" xmlns:r="http://schemas.openxmlformats.org/officeDocument/2006/relationships" xmlns:p="http://schemas.openxmlformats.org/presentationml/2006/main">
   <p:cSld>
     <p:bg>
@@ -11212,155 +13262,6 @@
         <p14:creationId xmlns:p14="http://schemas.microsoft.com/office/powerpoint/2010/main" val="2915200744"/>
       </p:ext>
     </p:extLst>
-  </p:cSld>
-  <p:clrMapOvr>
-    <a:masterClrMapping/>
-  </p:clrMapOvr>
-</p:sld>
-</file>
-
-<file path=ppt/slides/slide8.xml><?xml version="1.0" encoding="utf-8"?>
-<p:sld xmlns:a="http://schemas.openxmlformats.org/drawingml/2006/main" xmlns:r="http://schemas.openxmlformats.org/officeDocument/2006/relationships" xmlns:p="http://schemas.openxmlformats.org/presentationml/2006/main">
-  <p:cSld>
-    <p:bg>
-      <p:bgPr>
-        <a:solidFill>
-          <a:srgbClr val="FF609A"/>
-        </a:solidFill>
-        <a:effectLst/>
-      </p:bgPr>
-    </p:bg>
-    <p:spTree>
-      <p:nvGrpSpPr>
-        <p:cNvPr id="1" name="Shape 148"/>
-        <p:cNvGrpSpPr/>
-        <p:nvPr/>
-      </p:nvGrpSpPr>
-      <p:grpSpPr>
-        <a:xfrm>
-          <a:off x="0" y="0"/>
-          <a:ext cx="0" cy="0"/>
-          <a:chOff x="0" y="0"/>
-          <a:chExt cx="0" cy="0"/>
-        </a:xfrm>
-      </p:grpSpPr>
-      <p:pic>
-        <p:nvPicPr>
-          <p:cNvPr id="3" name="Picture 2">
-            <a:extLst>
-              <a:ext uri="{FF2B5EF4-FFF2-40B4-BE49-F238E27FC236}">
-                <a16:creationId xmlns:a16="http://schemas.microsoft.com/office/drawing/2014/main" id="{60981012-8926-224D-A170-BC4DBE994BF8}"/>
-              </a:ext>
-            </a:extLst>
-          </p:cNvPr>
-          <p:cNvPicPr>
-            <a:picLocks noChangeAspect="1"/>
-          </p:cNvPicPr>
-          <p:nvPr/>
-        </p:nvPicPr>
-        <p:blipFill>
-          <a:blip r:embed="rId3"/>
-          <a:stretch>
-            <a:fillRect/>
-          </a:stretch>
-        </p:blipFill>
-        <p:spPr>
-          <a:xfrm>
-            <a:off x="0" y="0"/>
-            <a:ext cx="9144000" cy="5143500"/>
-          </a:xfrm>
-          <a:prstGeom prst="rect">
-            <a:avLst/>
-          </a:prstGeom>
-        </p:spPr>
-      </p:pic>
-      <p:sp>
-        <p:nvSpPr>
-          <p:cNvPr id="152" name="Google Shape;152;p24"/>
-          <p:cNvSpPr txBox="1"/>
-          <p:nvPr/>
-        </p:nvSpPr>
-        <p:spPr>
-          <a:xfrm>
-            <a:off x="450000" y="927425"/>
-            <a:ext cx="4206300" cy="738900"/>
-          </a:xfrm>
-          <a:prstGeom prst="rect">
-            <a:avLst/>
-          </a:prstGeom>
-          <a:noFill/>
-          <a:ln>
-            <a:noFill/>
-          </a:ln>
-        </p:spPr>
-        <p:txBody>
-          <a:bodyPr spcFirstLastPara="1" wrap="square" lIns="91425" tIns="91425" rIns="91425" bIns="91425" anchor="t" anchorCtr="0">
-            <a:spAutoFit/>
-          </a:bodyPr>
-          <a:lstStyle/>
-          <a:p>
-            <a:pPr marL="0" lvl="0" indent="0" algn="l" rtl="0">
-              <a:spcBef>
-                <a:spcPts val="0"/>
-              </a:spcBef>
-              <a:spcAft>
-                <a:spcPts val="0"/>
-              </a:spcAft>
-              <a:buNone/>
-            </a:pPr>
-            <a:r>
-              <a:rPr lang="pt-BR" sz="3600" dirty="0">
-                <a:solidFill>
-                  <a:srgbClr val="FFFFFF"/>
-                </a:solidFill>
-                <a:latin typeface="Montserrat Black"/>
-                <a:ea typeface="Montserrat Black"/>
-                <a:cs typeface="Montserrat Black"/>
-                <a:sym typeface="Montserrat Black"/>
-              </a:rPr>
-              <a:t>Obrigada!</a:t>
-            </a:r>
-            <a:endParaRPr sz="3600" dirty="0">
-              <a:solidFill>
-                <a:srgbClr val="FFFFFF"/>
-              </a:solidFill>
-              <a:latin typeface="Montserrat Black"/>
-              <a:ea typeface="Montserrat Black"/>
-              <a:cs typeface="Montserrat Black"/>
-              <a:sym typeface="Montserrat Black"/>
-            </a:endParaRPr>
-          </a:p>
-        </p:txBody>
-      </p:sp>
-      <p:pic>
-        <p:nvPicPr>
-          <p:cNvPr id="155" name="Google Shape;155;p24"/>
-          <p:cNvPicPr preferRelativeResize="0"/>
-          <p:nvPr/>
-        </p:nvPicPr>
-        <p:blipFill>
-          <a:blip r:embed="rId4">
-            <a:alphaModFix/>
-          </a:blip>
-          <a:stretch>
-            <a:fillRect/>
-          </a:stretch>
-        </p:blipFill>
-        <p:spPr>
-          <a:xfrm>
-            <a:off x="7559263" y="4404125"/>
-            <a:ext cx="1134737" cy="365875"/>
-          </a:xfrm>
-          <a:prstGeom prst="rect">
-            <a:avLst/>
-          </a:prstGeom>
-          <a:noFill/>
-          <a:ln>
-            <a:noFill/>
-          </a:ln>
-        </p:spPr>
-      </p:pic>
-    </p:spTree>
   </p:cSld>
   <p:clrMapOvr>
     <a:masterClrMapping/>

</xml_diff>